<commit_message>
Update text wrapping in slidedeck
</commit_message>
<xml_diff>
--- a/S16.pptx
+++ b/S16.pptx
@@ -1,49 +1,53 @@
 
 <file path=ppt/presentation.xml><?xml version="1.0" encoding="utf-8"?>
-<p:presentation xmlns:a="http://schemas.openxmlformats.org/drawingml/2006/main" xmlns:r="http://schemas.openxmlformats.org/officeDocument/2006/relationships" xmlns:p="http://schemas.openxmlformats.org/presentationml/2006/main" saveSubsetFonts="1" embedTrueTypeFonts="true">
+<p:presentation xmlns:a="http://schemas.openxmlformats.org/drawingml/2006/main" xmlns:r="http://schemas.openxmlformats.org/officeDocument/2006/relationships" xmlns:p="http://schemas.openxmlformats.org/presentationml/2006/main" embedTrueTypeFonts="1" saveSubsetFonts="1">
   <p:sldMasterIdLst>
     <p:sldMasterId id="2147483648" r:id="rId1"/>
   </p:sldMasterIdLst>
   <p:notesMasterIdLst>
-    <p:notesMasterId r:id="rId19"/>
+    <p:notesMasterId r:id="rId11"/>
   </p:notesMasterIdLst>
   <p:sldIdLst>
-    <p:sldId id="256" r:id="rId6"/>
-    <p:sldId id="257" r:id="rId7"/>
-    <p:sldId id="258" r:id="rId8"/>
-    <p:sldId id="259" r:id="rId9"/>
-    <p:sldId id="260" r:id="rId10"/>
-    <p:sldId id="261" r:id="rId11"/>
-    <p:sldId id="262" r:id="rId12"/>
-    <p:sldId id="263" r:id="rId13"/>
-    <p:sldId id="264" r:id="rId14"/>
+    <p:sldId id="256" r:id="rId2"/>
+    <p:sldId id="257" r:id="rId3"/>
+    <p:sldId id="258" r:id="rId4"/>
+    <p:sldId id="259" r:id="rId5"/>
+    <p:sldId id="260" r:id="rId6"/>
+    <p:sldId id="261" r:id="rId7"/>
+    <p:sldId id="262" r:id="rId8"/>
+    <p:sldId id="263" r:id="rId9"/>
+    <p:sldId id="264" r:id="rId10"/>
   </p:sldIdLst>
   <p:sldSz cx="18288000" cy="10287000"/>
   <p:notesSz cx="6858000" cy="9144000"/>
   <p:embeddedFontLst>
     <p:embeddedFont>
-      <p:font typeface="Oswald Bold" charset="1" panose="00000800000000000000"/>
-      <p:regular r:id="rId15"/>
+      <p:font typeface="Canva Sans Bold" panose="020B0803030501040103" pitchFamily="34" charset="0"/>
+      <p:regular r:id="rId12"/>
+      <p:bold r:id="rId13"/>
     </p:embeddedFont>
     <p:embeddedFont>
-      <p:font typeface="Montserrat Classic Bold" charset="1" panose="00000800000000000000"/>
-      <p:regular r:id="rId16"/>
+      <p:font typeface="DM Sans" pitchFamily="2" charset="77"/>
+      <p:regular r:id="rId14"/>
     </p:embeddedFont>
     <p:embeddedFont>
-      <p:font typeface="DM Sans" charset="1" panose="00000000000000000000"/>
-      <p:regular r:id="rId17"/>
+      <p:font typeface="DM Sans Bold" pitchFamily="2" charset="77"/>
+      <p:regular r:id="rId15"/>
+      <p:bold r:id="rId16"/>
     </p:embeddedFont>
     <p:embeddedFont>
-      <p:font typeface="DM Sans Bold" charset="1" panose="00000000000000000000"/>
-      <p:regular r:id="rId18"/>
+      <p:font typeface="Montserrat Classic Bold" pitchFamily="2" charset="77"/>
+      <p:regular r:id="rId17"/>
+      <p:bold r:id="rId18"/>
     </p:embeddedFont>
     <p:embeddedFont>
-      <p:font typeface="Canva Sans Bold" charset="1" panose="020B0803030501040103"/>
-      <p:regular r:id="rId22"/>
+      <p:font typeface="Open Sauce" pitchFamily="2" charset="77"/>
+      <p:regular r:id="rId19"/>
     </p:embeddedFont>
     <p:embeddedFont>
-      <p:font typeface="Open Sauce" charset="1" panose="00000500000000000000"/>
-      <p:regular r:id="rId23"/>
+      <p:font typeface="Oswald Bold" pitchFamily="2" charset="77"/>
+      <p:regular r:id="rId20"/>
+      <p:bold r:id="rId21"/>
     </p:embeddedFont>
   </p:embeddedFontLst>
   <p:defaultTextStyle>
@@ -141,6 +145,22 @@
       </a:defRPr>
     </a:lvl9pPr>
   </p:defaultTextStyle>
+  <p:extLst>
+    <p:ext uri="{EFAFB233-063F-42B5-8137-9DF3F51BA10A}">
+      <p15:sldGuideLst xmlns:p15="http://schemas.microsoft.com/office/powerpoint/2012/main">
+        <p15:guide id="1" orient="horz" pos="2160">
+          <p15:clr>
+            <a:srgbClr val="A4A3A4"/>
+          </p15:clr>
+        </p15:guide>
+        <p15:guide id="2" pos="2880">
+          <p15:clr>
+            <a:srgbClr val="A4A3A4"/>
+          </p15:clr>
+        </p15:guide>
+      </p15:sldGuideLst>
+    </p:ext>
+  </p:extLst>
 </p:presentation>
 </file>
 
@@ -226,7 +246,7 @@
           <a:p>
             <a:fld id="{B7268E1E-0E44-426D-905E-8AD9B19D2182}" type="datetimeFigureOut">
               <a:rPr lang="cs-CZ" smtClean="0"/>
-              <a:t>1.7.2013</a:t>
+              <a:t>16.09.2024</a:t>
             </a:fld>
             <a:endParaRPr lang="cs-CZ"/>
           </a:p>
@@ -290,35 +310,35 @@
           <a:p>
             <a:pPr lvl="0"/>
             <a:r>
-              <a:rPr lang="en-US" smtClean="0"/>
+              <a:rPr lang="en-US"/>
               <a:t>Click to edit Master text styles</a:t>
             </a:r>
           </a:p>
           <a:p>
             <a:pPr lvl="1"/>
             <a:r>
-              <a:rPr lang="en-US" smtClean="0"/>
+              <a:rPr lang="en-US"/>
               <a:t>Second level</a:t>
             </a:r>
           </a:p>
           <a:p>
             <a:pPr lvl="2"/>
             <a:r>
-              <a:rPr lang="en-US" smtClean="0"/>
+              <a:rPr lang="en-US"/>
               <a:t>Third level</a:t>
             </a:r>
           </a:p>
           <a:p>
             <a:pPr lvl="3"/>
             <a:r>
-              <a:rPr lang="en-US" smtClean="0"/>
+              <a:rPr lang="en-US"/>
               <a:t>Fourth level</a:t>
             </a:r>
           </a:p>
           <a:p>
             <a:pPr lvl="4"/>
             <a:r>
-              <a:rPr lang="en-US" smtClean="0"/>
+              <a:rPr lang="en-US"/>
               <a:t>Fifth level</a:t>
             </a:r>
             <a:endParaRPr lang="cs-CZ"/>
@@ -495,9 +515,9 @@
 </file>
 
 <file path=ppt/notesSlides/notesSlide1.xml><?xml version="1.0" encoding="utf-8"?>
-<p:notes xmlns:p="http://schemas.openxmlformats.org/presentationml/2006/main">
+<p:notes xmlns:a="http://schemas.openxmlformats.org/drawingml/2006/main" xmlns:r="http://schemas.openxmlformats.org/officeDocument/2006/relationships" xmlns:p="http://schemas.openxmlformats.org/presentationml/2006/main">
   <p:cSld>
-    <p:spTree xmlns:a="http://schemas.openxmlformats.org/drawingml/2006/main" xmlns:r="http://schemas.openxmlformats.org/officeDocument/2006/relationships">
+    <p:spTree>
       <p:nvGrpSpPr>
         <p:cNvPr id="1" name=""/>
         <p:cNvGrpSpPr/>
@@ -537,7 +557,9 @@
               <a:defRPr sz="1200"/>
             </a:lvl1pPr>
           </a:lstStyle>
-          <a:p/>
+          <a:p>
+            <a:endParaRPr/>
+          </a:p>
         </p:txBody>
       </p:sp>
       <p:sp>
@@ -567,8 +589,8 @@
             </a:lvl1pPr>
           </a:lstStyle>
           <a:p>
-            <a:r id="{B7268E1E-0E44-426D-905E-8AD9B19D2182}" type="datetimeFigureOut">
-              <a:rPr lang="cs-CZ" smtClean="0"/>
+            <a:r>
+              <a:rPr lang="cs-CZ"/>
               <a:t>1.7.2013</a:t>
             </a:r>
           </a:p>
@@ -586,8 +608,8 @@
         </p:nvSpPr>
         <p:spPr>
           <a:xfrm>
-            <a:off x="2857500" y="512763"/>
-            <a:ext cx="3429000" cy="2566987"/>
+            <a:off x="2290763" y="512763"/>
+            <a:ext cx="4562475" cy="2566987"/>
           </a:xfrm>
           <a:prstGeom prst="rect">
             <a:avLst/>
@@ -602,7 +624,9 @@
         <p:txBody>
           <a:bodyPr vert="horz" lIns="91440" tIns="45720" rIns="91440" bIns="45720" rtlCol="0" anchor="ctr"/>
           <a:lstStyle/>
-          <a:p/>
+          <a:p>
+            <a:endParaRPr/>
+          </a:p>
         </p:txBody>
       </p:sp>
       <p:sp>
@@ -634,10 +658,7 @@
             </a:r>
           </a:p>
           <a:p>
-            <a:r>
-              <a:rPr lang="en-US"/>
-              <a:t/>
-            </a:r>
+            <a:endParaRPr lang="en-US"/>
           </a:p>
           <a:p>
             <a:r>
@@ -673,7 +694,9 @@
               <a:defRPr sz="1200"/>
             </a:lvl1pPr>
           </a:lstStyle>
-          <a:p/>
+          <a:p>
+            <a:endParaRPr/>
+          </a:p>
         </p:txBody>
       </p:sp>
       <p:sp>
@@ -703,8 +726,8 @@
             </a:lvl1pPr>
           </a:lstStyle>
           <a:p>
-            <a:r id="{871B2431-D351-4C6E-A3CF-9DFAC0E3E050}" type="slidenum">
-              <a:rPr lang="cs-CZ" smtClean="0"/>
+            <a:r>
+              <a:rPr lang="cs-CZ"/>
               <a:t>‹#›</a:t>
             </a:r>
           </a:p>
@@ -712,13 +735,16 @@
       </p:sp>
     </p:spTree>
   </p:cSld>
+  <p:clrMapOvr>
+    <a:masterClrMapping/>
+  </p:clrMapOvr>
 </p:notes>
 </file>
 
 <file path=ppt/notesSlides/notesSlide2.xml><?xml version="1.0" encoding="utf-8"?>
-<p:notes xmlns:p="http://schemas.openxmlformats.org/presentationml/2006/main">
+<p:notes xmlns:a="http://schemas.openxmlformats.org/drawingml/2006/main" xmlns:r="http://schemas.openxmlformats.org/officeDocument/2006/relationships" xmlns:p="http://schemas.openxmlformats.org/presentationml/2006/main">
   <p:cSld>
-    <p:spTree xmlns:a="http://schemas.openxmlformats.org/drawingml/2006/main" xmlns:r="http://schemas.openxmlformats.org/officeDocument/2006/relationships">
+    <p:spTree>
       <p:nvGrpSpPr>
         <p:cNvPr id="1" name=""/>
         <p:cNvGrpSpPr/>
@@ -758,7 +784,9 @@
               <a:defRPr sz="1200"/>
             </a:lvl1pPr>
           </a:lstStyle>
-          <a:p/>
+          <a:p>
+            <a:endParaRPr/>
+          </a:p>
         </p:txBody>
       </p:sp>
       <p:sp>
@@ -788,8 +816,8 @@
             </a:lvl1pPr>
           </a:lstStyle>
           <a:p>
-            <a:r id="{B7268E1E-0E44-426D-905E-8AD9B19D2182}" type="datetimeFigureOut">
-              <a:rPr lang="cs-CZ" smtClean="0"/>
+            <a:r>
+              <a:rPr lang="cs-CZ"/>
               <a:t>1.7.2013</a:t>
             </a:r>
           </a:p>
@@ -823,7 +851,9 @@
         <p:txBody>
           <a:bodyPr vert="horz" lIns="91440" tIns="45720" rIns="91440" bIns="45720" rtlCol="0" anchor="ctr"/>
           <a:lstStyle/>
-          <a:p/>
+          <a:p>
+            <a:endParaRPr/>
+          </a:p>
         </p:txBody>
       </p:sp>
       <p:sp>
@@ -855,10 +885,7 @@
             </a:r>
           </a:p>
           <a:p>
-            <a:r>
-              <a:rPr lang="en-US"/>
-              <a:t/>
-            </a:r>
+            <a:endParaRPr lang="en-US"/>
           </a:p>
           <a:p>
             <a:r>
@@ -867,10 +894,7 @@
             </a:r>
           </a:p>
           <a:p>
-            <a:r>
-              <a:rPr lang="en-US"/>
-              <a:t/>
-            </a:r>
+            <a:endParaRPr lang="en-US"/>
           </a:p>
           <a:p>
             <a:r>
@@ -906,7 +930,9 @@
               <a:defRPr sz="1200"/>
             </a:lvl1pPr>
           </a:lstStyle>
-          <a:p/>
+          <a:p>
+            <a:endParaRPr/>
+          </a:p>
         </p:txBody>
       </p:sp>
       <p:sp>
@@ -936,8 +962,8 @@
             </a:lvl1pPr>
           </a:lstStyle>
           <a:p>
-            <a:r id="{871B2431-D351-4C6E-A3CF-9DFAC0E3E050}" type="slidenum">
-              <a:rPr lang="cs-CZ" smtClean="0"/>
+            <a:r>
+              <a:rPr lang="cs-CZ"/>
               <a:t>‹#›</a:t>
             </a:r>
           </a:p>
@@ -945,13 +971,16 @@
       </p:sp>
     </p:spTree>
   </p:cSld>
+  <p:clrMapOvr>
+    <a:masterClrMapping/>
+  </p:clrMapOvr>
 </p:notes>
 </file>
 
 <file path=ppt/notesSlides/notesSlide3.xml><?xml version="1.0" encoding="utf-8"?>
-<p:notes xmlns:p="http://schemas.openxmlformats.org/presentationml/2006/main">
+<p:notes xmlns:a="http://schemas.openxmlformats.org/drawingml/2006/main" xmlns:r="http://schemas.openxmlformats.org/officeDocument/2006/relationships" xmlns:p="http://schemas.openxmlformats.org/presentationml/2006/main">
   <p:cSld>
-    <p:spTree xmlns:a="http://schemas.openxmlformats.org/drawingml/2006/main" xmlns:r="http://schemas.openxmlformats.org/officeDocument/2006/relationships">
+    <p:spTree>
       <p:nvGrpSpPr>
         <p:cNvPr id="1" name=""/>
         <p:cNvGrpSpPr/>
@@ -991,7 +1020,9 @@
               <a:defRPr sz="1200"/>
             </a:lvl1pPr>
           </a:lstStyle>
-          <a:p/>
+          <a:p>
+            <a:endParaRPr/>
+          </a:p>
         </p:txBody>
       </p:sp>
       <p:sp>
@@ -1021,8 +1052,8 @@
             </a:lvl1pPr>
           </a:lstStyle>
           <a:p>
-            <a:r id="{B7268E1E-0E44-426D-905E-8AD9B19D2182}" type="datetimeFigureOut">
-              <a:rPr lang="cs-CZ" smtClean="0"/>
+            <a:r>
+              <a:rPr lang="cs-CZ"/>
               <a:t>1.7.2013</a:t>
             </a:r>
           </a:p>
@@ -1056,7 +1087,9 @@
         <p:txBody>
           <a:bodyPr vert="horz" lIns="91440" tIns="45720" rIns="91440" bIns="45720" rtlCol="0" anchor="ctr"/>
           <a:lstStyle/>
-          <a:p/>
+          <a:p>
+            <a:endParaRPr/>
+          </a:p>
         </p:txBody>
       </p:sp>
       <p:sp>
@@ -1083,37 +1116,34 @@
           <a:lstStyle/>
           <a:p>
             <a:r>
-              <a:rPr lang="en-US"/>
+              <a:rPr lang="en-US" dirty="0"/>
               <a:t>This slide presents sales data by product category and age group.</a:t>
             </a:r>
           </a:p>
           <a:p>
-            <a:r>
-              <a:rPr lang="en-US"/>
-              <a:t/>
-            </a:r>
-          </a:p>
-          <a:p>
-            <a:r>
-              <a:rPr lang="en-US"/>
+            <a:endParaRPr lang="en-US" dirty="0"/>
+          </a:p>
+          <a:p>
+            <a:r>
+              <a:rPr lang="en-US" dirty="0"/>
               <a:t>Electronics perform strongly across all age groups, especially among 46-55 year-olds with $35,485 in sales.</a:t>
             </a:r>
           </a:p>
           <a:p>
             <a:r>
-              <a:rPr lang="en-US"/>
+              <a:rPr lang="en-US" dirty="0"/>
               <a:t>Clothing shows consistent sales, peaking in the 26-35 age group at $39,975.</a:t>
             </a:r>
           </a:p>
           <a:p>
             <a:r>
-              <a:rPr lang="en-US"/>
+              <a:rPr lang="en-US" dirty="0"/>
               <a:t>Beauty Products have the highest sales in the 46-55 age group with $34,720, indicating strong interest from this demographic.</a:t>
             </a:r>
           </a:p>
           <a:p>
             <a:r>
-              <a:rPr lang="en-US"/>
+              <a:rPr lang="en-US" dirty="0"/>
               <a:t>Overall, Electronics lead with $156,905 in total sales, closely followed by Clothing ($155,580) and Beauty ($143,515).</a:t>
             </a:r>
           </a:p>
@@ -1145,7 +1175,9 @@
               <a:defRPr sz="1200"/>
             </a:lvl1pPr>
           </a:lstStyle>
-          <a:p/>
+          <a:p>
+            <a:endParaRPr/>
+          </a:p>
         </p:txBody>
       </p:sp>
       <p:sp>
@@ -1175,8 +1207,8 @@
             </a:lvl1pPr>
           </a:lstStyle>
           <a:p>
-            <a:r id="{871B2431-D351-4C6E-A3CF-9DFAC0E3E050}" type="slidenum">
-              <a:rPr lang="cs-CZ" smtClean="0"/>
+            <a:r>
+              <a:rPr lang="cs-CZ"/>
               <a:t>‹#›</a:t>
             </a:r>
           </a:p>
@@ -1184,6 +1216,9 @@
       </p:sp>
     </p:spTree>
   </p:cSld>
+  <p:clrMapOvr>
+    <a:masterClrMapping/>
+  </p:clrMapOvr>
 </p:notes>
 </file>
 
@@ -1225,10 +1260,9 @@
           <a:lstStyle/>
           <a:p>
             <a:r>
-              <a:rPr lang="en-US" smtClean="0"/>
+              <a:rPr lang="en-US"/>
               <a:t>Click to edit Master title style</a:t>
             </a:r>
-            <a:endParaRPr lang="en-US"/>
           </a:p>
         </p:txBody>
       </p:sp>
@@ -1344,10 +1378,9 @@
           </a:lstStyle>
           <a:p>
             <a:r>
-              <a:rPr lang="en-US" smtClean="0"/>
+              <a:rPr lang="en-US"/>
               <a:t>Click to edit Master subtitle style</a:t>
             </a:r>
-            <a:endParaRPr lang="en-US"/>
           </a:p>
         </p:txBody>
       </p:sp>
@@ -1369,7 +1402,7 @@
             <a:fld id="{1D8BD707-D9CF-40AE-B4C6-C98DA3205C09}" type="datetimeFigureOut">
               <a:rPr lang="en-US" smtClean="0"/>
               <a:pPr/>
-              <a:t>8/1/2011</a:t>
+              <a:t>9/16/24</a:t>
             </a:fld>
             <a:endParaRPr lang="en-US"/>
           </a:p>
@@ -1459,10 +1492,9 @@
           <a:lstStyle/>
           <a:p>
             <a:r>
-              <a:rPr lang="en-US" smtClean="0"/>
+              <a:rPr lang="en-US"/>
               <a:t>Click to edit Master title style</a:t>
             </a:r>
-            <a:endParaRPr lang="en-US"/>
           </a:p>
         </p:txBody>
       </p:sp>
@@ -1483,38 +1515,37 @@
           <a:p>
             <a:pPr lvl="0"/>
             <a:r>
-              <a:rPr lang="en-US" smtClean="0"/>
+              <a:rPr lang="en-US"/>
               <a:t>Click to edit Master text styles</a:t>
             </a:r>
           </a:p>
           <a:p>
             <a:pPr lvl="1"/>
             <a:r>
-              <a:rPr lang="en-US" smtClean="0"/>
+              <a:rPr lang="en-US"/>
               <a:t>Second level</a:t>
             </a:r>
           </a:p>
           <a:p>
             <a:pPr lvl="2"/>
             <a:r>
-              <a:rPr lang="en-US" smtClean="0"/>
+              <a:rPr lang="en-US"/>
               <a:t>Third level</a:t>
             </a:r>
           </a:p>
           <a:p>
             <a:pPr lvl="3"/>
             <a:r>
-              <a:rPr lang="en-US" smtClean="0"/>
+              <a:rPr lang="en-US"/>
               <a:t>Fourth level</a:t>
             </a:r>
           </a:p>
           <a:p>
             <a:pPr lvl="4"/>
             <a:r>
-              <a:rPr lang="en-US" smtClean="0"/>
+              <a:rPr lang="en-US"/>
               <a:t>Fifth level</a:t>
             </a:r>
-            <a:endParaRPr lang="en-US"/>
           </a:p>
         </p:txBody>
       </p:sp>
@@ -1536,7 +1567,7 @@
             <a:fld id="{1D8BD707-D9CF-40AE-B4C6-C98DA3205C09}" type="datetimeFigureOut">
               <a:rPr lang="en-US" smtClean="0"/>
               <a:pPr/>
-              <a:t>8/1/2011</a:t>
+              <a:t>9/16/24</a:t>
             </a:fld>
             <a:endParaRPr lang="en-US"/>
           </a:p>
@@ -1631,10 +1662,9 @@
           <a:lstStyle/>
           <a:p>
             <a:r>
-              <a:rPr lang="en-US" smtClean="0"/>
+              <a:rPr lang="en-US"/>
               <a:t>Click to edit Master title style</a:t>
             </a:r>
-            <a:endParaRPr lang="en-US"/>
           </a:p>
         </p:txBody>
       </p:sp>
@@ -1660,38 +1690,37 @@
           <a:p>
             <a:pPr lvl="0"/>
             <a:r>
-              <a:rPr lang="en-US" smtClean="0"/>
+              <a:rPr lang="en-US"/>
               <a:t>Click to edit Master text styles</a:t>
             </a:r>
           </a:p>
           <a:p>
             <a:pPr lvl="1"/>
             <a:r>
-              <a:rPr lang="en-US" smtClean="0"/>
+              <a:rPr lang="en-US"/>
               <a:t>Second level</a:t>
             </a:r>
           </a:p>
           <a:p>
             <a:pPr lvl="2"/>
             <a:r>
-              <a:rPr lang="en-US" smtClean="0"/>
+              <a:rPr lang="en-US"/>
               <a:t>Third level</a:t>
             </a:r>
           </a:p>
           <a:p>
             <a:pPr lvl="3"/>
             <a:r>
-              <a:rPr lang="en-US" smtClean="0"/>
+              <a:rPr lang="en-US"/>
               <a:t>Fourth level</a:t>
             </a:r>
           </a:p>
           <a:p>
             <a:pPr lvl="4"/>
             <a:r>
-              <a:rPr lang="en-US" smtClean="0"/>
+              <a:rPr lang="en-US"/>
               <a:t>Fifth level</a:t>
             </a:r>
-            <a:endParaRPr lang="en-US"/>
           </a:p>
         </p:txBody>
       </p:sp>
@@ -1713,7 +1742,7 @@
             <a:fld id="{1D8BD707-D9CF-40AE-B4C6-C98DA3205C09}" type="datetimeFigureOut">
               <a:rPr lang="en-US" smtClean="0"/>
               <a:pPr/>
-              <a:t>8/1/2011</a:t>
+              <a:t>9/16/24</a:t>
             </a:fld>
             <a:endParaRPr lang="en-US"/>
           </a:p>
@@ -1803,10 +1832,9 @@
           <a:lstStyle/>
           <a:p>
             <a:r>
-              <a:rPr lang="en-US" smtClean="0"/>
+              <a:rPr lang="en-US"/>
               <a:t>Click to edit Master title style</a:t>
             </a:r>
-            <a:endParaRPr lang="en-US"/>
           </a:p>
         </p:txBody>
       </p:sp>
@@ -1827,38 +1855,37 @@
           <a:p>
             <a:pPr lvl="0"/>
             <a:r>
-              <a:rPr lang="en-US" smtClean="0"/>
+              <a:rPr lang="en-US"/>
               <a:t>Click to edit Master text styles</a:t>
             </a:r>
           </a:p>
           <a:p>
             <a:pPr lvl="1"/>
             <a:r>
-              <a:rPr lang="en-US" smtClean="0"/>
+              <a:rPr lang="en-US"/>
               <a:t>Second level</a:t>
             </a:r>
           </a:p>
           <a:p>
             <a:pPr lvl="2"/>
             <a:r>
-              <a:rPr lang="en-US" smtClean="0"/>
+              <a:rPr lang="en-US"/>
               <a:t>Third level</a:t>
             </a:r>
           </a:p>
           <a:p>
             <a:pPr lvl="3"/>
             <a:r>
-              <a:rPr lang="en-US" smtClean="0"/>
+              <a:rPr lang="en-US"/>
               <a:t>Fourth level</a:t>
             </a:r>
           </a:p>
           <a:p>
             <a:pPr lvl="4"/>
             <a:r>
-              <a:rPr lang="en-US" smtClean="0"/>
+              <a:rPr lang="en-US"/>
               <a:t>Fifth level</a:t>
             </a:r>
-            <a:endParaRPr lang="en-US"/>
           </a:p>
         </p:txBody>
       </p:sp>
@@ -1880,7 +1907,7 @@
             <a:fld id="{1D8BD707-D9CF-40AE-B4C6-C98DA3205C09}" type="datetimeFigureOut">
               <a:rPr lang="en-US" smtClean="0"/>
               <a:pPr/>
-              <a:t>8/1/2011</a:t>
+              <a:t>9/16/24</a:t>
             </a:fld>
             <a:endParaRPr lang="en-US"/>
           </a:p>
@@ -1979,10 +2006,9 @@
           </a:lstStyle>
           <a:p>
             <a:r>
-              <a:rPr lang="en-US" smtClean="0"/>
+              <a:rPr lang="en-US"/>
               <a:t>Click to edit Master title style</a:t>
             </a:r>
-            <a:endParaRPr lang="en-US"/>
           </a:p>
         </p:txBody>
       </p:sp>
@@ -2099,7 +2125,7 @@
           <a:p>
             <a:pPr lvl="0"/>
             <a:r>
-              <a:rPr lang="en-US" smtClean="0"/>
+              <a:rPr lang="en-US"/>
               <a:t>Click to edit Master text styles</a:t>
             </a:r>
           </a:p>
@@ -2123,7 +2149,7 @@
             <a:fld id="{1D8BD707-D9CF-40AE-B4C6-C98DA3205C09}" type="datetimeFigureOut">
               <a:rPr lang="en-US" smtClean="0"/>
               <a:pPr/>
-              <a:t>8/1/2011</a:t>
+              <a:t>9/16/24</a:t>
             </a:fld>
             <a:endParaRPr lang="en-US"/>
           </a:p>
@@ -2213,10 +2239,9 @@
           <a:lstStyle/>
           <a:p>
             <a:r>
-              <a:rPr lang="en-US" smtClean="0"/>
+              <a:rPr lang="en-US"/>
               <a:t>Click to edit Master title style</a:t>
             </a:r>
-            <a:endParaRPr lang="en-US"/>
           </a:p>
         </p:txBody>
       </p:sp>
@@ -2270,38 +2295,37 @@
           <a:p>
             <a:pPr lvl="0"/>
             <a:r>
-              <a:rPr lang="en-US" smtClean="0"/>
+              <a:rPr lang="en-US"/>
               <a:t>Click to edit Master text styles</a:t>
             </a:r>
           </a:p>
           <a:p>
             <a:pPr lvl="1"/>
             <a:r>
-              <a:rPr lang="en-US" smtClean="0"/>
+              <a:rPr lang="en-US"/>
               <a:t>Second level</a:t>
             </a:r>
           </a:p>
           <a:p>
             <a:pPr lvl="2"/>
             <a:r>
-              <a:rPr lang="en-US" smtClean="0"/>
+              <a:rPr lang="en-US"/>
               <a:t>Third level</a:t>
             </a:r>
           </a:p>
           <a:p>
             <a:pPr lvl="3"/>
             <a:r>
-              <a:rPr lang="en-US" smtClean="0"/>
+              <a:rPr lang="en-US"/>
               <a:t>Fourth level</a:t>
             </a:r>
           </a:p>
           <a:p>
             <a:pPr lvl="4"/>
             <a:r>
-              <a:rPr lang="en-US" smtClean="0"/>
+              <a:rPr lang="en-US"/>
               <a:t>Fifth level</a:t>
             </a:r>
-            <a:endParaRPr lang="en-US"/>
           </a:p>
         </p:txBody>
       </p:sp>
@@ -2355,38 +2379,37 @@
           <a:p>
             <a:pPr lvl="0"/>
             <a:r>
-              <a:rPr lang="en-US" smtClean="0"/>
+              <a:rPr lang="en-US"/>
               <a:t>Click to edit Master text styles</a:t>
             </a:r>
           </a:p>
           <a:p>
             <a:pPr lvl="1"/>
             <a:r>
-              <a:rPr lang="en-US" smtClean="0"/>
+              <a:rPr lang="en-US"/>
               <a:t>Second level</a:t>
             </a:r>
           </a:p>
           <a:p>
             <a:pPr lvl="2"/>
             <a:r>
-              <a:rPr lang="en-US" smtClean="0"/>
+              <a:rPr lang="en-US"/>
               <a:t>Third level</a:t>
             </a:r>
           </a:p>
           <a:p>
             <a:pPr lvl="3"/>
             <a:r>
-              <a:rPr lang="en-US" smtClean="0"/>
+              <a:rPr lang="en-US"/>
               <a:t>Fourth level</a:t>
             </a:r>
           </a:p>
           <a:p>
             <a:pPr lvl="4"/>
             <a:r>
-              <a:rPr lang="en-US" smtClean="0"/>
+              <a:rPr lang="en-US"/>
               <a:t>Fifth level</a:t>
             </a:r>
-            <a:endParaRPr lang="en-US"/>
           </a:p>
         </p:txBody>
       </p:sp>
@@ -2408,7 +2431,7 @@
             <a:fld id="{1D8BD707-D9CF-40AE-B4C6-C98DA3205C09}" type="datetimeFigureOut">
               <a:rPr lang="en-US" smtClean="0"/>
               <a:pPr/>
-              <a:t>8/1/2011</a:t>
+              <a:t>9/16/24</a:t>
             </a:fld>
             <a:endParaRPr lang="en-US"/>
           </a:p>
@@ -2502,10 +2525,9 @@
           </a:lstStyle>
           <a:p>
             <a:r>
-              <a:rPr lang="en-US" smtClean="0"/>
+              <a:rPr lang="en-US"/>
               <a:t>Click to edit Master title style</a:t>
             </a:r>
-            <a:endParaRPr lang="en-US"/>
           </a:p>
         </p:txBody>
       </p:sp>
@@ -2568,7 +2590,7 @@
           <a:p>
             <a:pPr lvl="0"/>
             <a:r>
-              <a:rPr lang="en-US" smtClean="0"/>
+              <a:rPr lang="en-US"/>
               <a:t>Click to edit Master text styles</a:t>
             </a:r>
           </a:p>
@@ -2624,38 +2646,37 @@
           <a:p>
             <a:pPr lvl="0"/>
             <a:r>
-              <a:rPr lang="en-US" smtClean="0"/>
+              <a:rPr lang="en-US"/>
               <a:t>Click to edit Master text styles</a:t>
             </a:r>
           </a:p>
           <a:p>
             <a:pPr lvl="1"/>
             <a:r>
-              <a:rPr lang="en-US" smtClean="0"/>
+              <a:rPr lang="en-US"/>
               <a:t>Second level</a:t>
             </a:r>
           </a:p>
           <a:p>
             <a:pPr lvl="2"/>
             <a:r>
-              <a:rPr lang="en-US" smtClean="0"/>
+              <a:rPr lang="en-US"/>
               <a:t>Third level</a:t>
             </a:r>
           </a:p>
           <a:p>
             <a:pPr lvl="3"/>
             <a:r>
-              <a:rPr lang="en-US" smtClean="0"/>
+              <a:rPr lang="en-US"/>
               <a:t>Fourth level</a:t>
             </a:r>
           </a:p>
           <a:p>
             <a:pPr lvl="4"/>
             <a:r>
-              <a:rPr lang="en-US" smtClean="0"/>
+              <a:rPr lang="en-US"/>
               <a:t>Fifth level</a:t>
             </a:r>
-            <a:endParaRPr lang="en-US"/>
           </a:p>
         </p:txBody>
       </p:sp>
@@ -2718,7 +2739,7 @@
           <a:p>
             <a:pPr lvl="0"/>
             <a:r>
-              <a:rPr lang="en-US" smtClean="0"/>
+              <a:rPr lang="en-US"/>
               <a:t>Click to edit Master text styles</a:t>
             </a:r>
           </a:p>
@@ -2774,38 +2795,37 @@
           <a:p>
             <a:pPr lvl="0"/>
             <a:r>
-              <a:rPr lang="en-US" smtClean="0"/>
+              <a:rPr lang="en-US"/>
               <a:t>Click to edit Master text styles</a:t>
             </a:r>
           </a:p>
           <a:p>
             <a:pPr lvl="1"/>
             <a:r>
-              <a:rPr lang="en-US" smtClean="0"/>
+              <a:rPr lang="en-US"/>
               <a:t>Second level</a:t>
             </a:r>
           </a:p>
           <a:p>
             <a:pPr lvl="2"/>
             <a:r>
-              <a:rPr lang="en-US" smtClean="0"/>
+              <a:rPr lang="en-US"/>
               <a:t>Third level</a:t>
             </a:r>
           </a:p>
           <a:p>
             <a:pPr lvl="3"/>
             <a:r>
-              <a:rPr lang="en-US" smtClean="0"/>
+              <a:rPr lang="en-US"/>
               <a:t>Fourth level</a:t>
             </a:r>
           </a:p>
           <a:p>
             <a:pPr lvl="4"/>
             <a:r>
-              <a:rPr lang="en-US" smtClean="0"/>
+              <a:rPr lang="en-US"/>
               <a:t>Fifth level</a:t>
             </a:r>
-            <a:endParaRPr lang="en-US"/>
           </a:p>
         </p:txBody>
       </p:sp>
@@ -2827,7 +2847,7 @@
             <a:fld id="{1D8BD707-D9CF-40AE-B4C6-C98DA3205C09}" type="datetimeFigureOut">
               <a:rPr lang="en-US" smtClean="0"/>
               <a:pPr/>
-              <a:t>8/1/2011</a:t>
+              <a:t>9/16/24</a:t>
             </a:fld>
             <a:endParaRPr lang="en-US"/>
           </a:p>
@@ -2917,10 +2937,9 @@
           <a:lstStyle/>
           <a:p>
             <a:r>
-              <a:rPr lang="en-US" smtClean="0"/>
+              <a:rPr lang="en-US"/>
               <a:t>Click to edit Master title style</a:t>
             </a:r>
-            <a:endParaRPr lang="en-US"/>
           </a:p>
         </p:txBody>
       </p:sp>
@@ -2942,7 +2961,7 @@
             <a:fld id="{1D8BD707-D9CF-40AE-B4C6-C98DA3205C09}" type="datetimeFigureOut">
               <a:rPr lang="en-US" smtClean="0"/>
               <a:pPr/>
-              <a:t>8/1/2011</a:t>
+              <a:t>9/16/24</a:t>
             </a:fld>
             <a:endParaRPr lang="en-US"/>
           </a:p>
@@ -3034,7 +3053,7 @@
             <a:fld id="{1D8BD707-D9CF-40AE-B4C6-C98DA3205C09}" type="datetimeFigureOut">
               <a:rPr lang="en-US" smtClean="0"/>
               <a:pPr/>
-              <a:t>8/1/2011</a:t>
+              <a:t>9/16/24</a:t>
             </a:fld>
             <a:endParaRPr lang="en-US"/>
           </a:p>
@@ -3133,10 +3152,9 @@
           </a:lstStyle>
           <a:p>
             <a:r>
-              <a:rPr lang="en-US" smtClean="0"/>
+              <a:rPr lang="en-US"/>
               <a:t>Click to edit Master title style</a:t>
             </a:r>
-            <a:endParaRPr lang="en-US"/>
           </a:p>
         </p:txBody>
       </p:sp>
@@ -3190,38 +3208,37 @@
           <a:p>
             <a:pPr lvl="0"/>
             <a:r>
-              <a:rPr lang="en-US" smtClean="0"/>
+              <a:rPr lang="en-US"/>
               <a:t>Click to edit Master text styles</a:t>
             </a:r>
           </a:p>
           <a:p>
             <a:pPr lvl="1"/>
             <a:r>
-              <a:rPr lang="en-US" smtClean="0"/>
+              <a:rPr lang="en-US"/>
               <a:t>Second level</a:t>
             </a:r>
           </a:p>
           <a:p>
             <a:pPr lvl="2"/>
             <a:r>
-              <a:rPr lang="en-US" smtClean="0"/>
+              <a:rPr lang="en-US"/>
               <a:t>Third level</a:t>
             </a:r>
           </a:p>
           <a:p>
             <a:pPr lvl="3"/>
             <a:r>
-              <a:rPr lang="en-US" smtClean="0"/>
+              <a:rPr lang="en-US"/>
               <a:t>Fourth level</a:t>
             </a:r>
           </a:p>
           <a:p>
             <a:pPr lvl="4"/>
             <a:r>
-              <a:rPr lang="en-US" smtClean="0"/>
+              <a:rPr lang="en-US"/>
               <a:t>Fifth level</a:t>
             </a:r>
-            <a:endParaRPr lang="en-US"/>
           </a:p>
         </p:txBody>
       </p:sp>
@@ -3284,7 +3301,7 @@
           <a:p>
             <a:pPr lvl="0"/>
             <a:r>
-              <a:rPr lang="en-US" smtClean="0"/>
+              <a:rPr lang="en-US"/>
               <a:t>Click to edit Master text styles</a:t>
             </a:r>
           </a:p>
@@ -3308,7 +3325,7 @@
             <a:fld id="{1D8BD707-D9CF-40AE-B4C6-C98DA3205C09}" type="datetimeFigureOut">
               <a:rPr lang="en-US" smtClean="0"/>
               <a:pPr/>
-              <a:t>8/1/2011</a:t>
+              <a:t>9/16/24</a:t>
             </a:fld>
             <a:endParaRPr lang="en-US"/>
           </a:p>
@@ -3407,10 +3424,9 @@
           </a:lstStyle>
           <a:p>
             <a:r>
-              <a:rPr lang="en-US" smtClean="0"/>
+              <a:rPr lang="en-US"/>
               <a:t>Click to edit Master title style</a:t>
             </a:r>
-            <a:endParaRPr lang="en-US"/>
           </a:p>
         </p:txBody>
       </p:sp>
@@ -3534,7 +3550,7 @@
           <a:p>
             <a:pPr lvl="0"/>
             <a:r>
-              <a:rPr lang="en-US" smtClean="0"/>
+              <a:rPr lang="en-US"/>
               <a:t>Click to edit Master text styles</a:t>
             </a:r>
           </a:p>
@@ -3558,7 +3574,7 @@
             <a:fld id="{1D8BD707-D9CF-40AE-B4C6-C98DA3205C09}" type="datetimeFigureOut">
               <a:rPr lang="en-US" smtClean="0"/>
               <a:pPr/>
-              <a:t>8/1/2011</a:t>
+              <a:t>9/16/24</a:t>
             </a:fld>
             <a:endParaRPr lang="en-US"/>
           </a:p>
@@ -3663,10 +3679,9 @@
           <a:lstStyle/>
           <a:p>
             <a:r>
-              <a:rPr lang="en-US" smtClean="0"/>
+              <a:rPr lang="en-US"/>
               <a:t>Click to edit Master title style</a:t>
             </a:r>
-            <a:endParaRPr lang="en-US"/>
           </a:p>
         </p:txBody>
       </p:sp>
@@ -3697,38 +3712,37 @@
           <a:p>
             <a:pPr lvl="0"/>
             <a:r>
-              <a:rPr lang="en-US" smtClean="0"/>
+              <a:rPr lang="en-US"/>
               <a:t>Click to edit Master text styles</a:t>
             </a:r>
           </a:p>
           <a:p>
             <a:pPr lvl="1"/>
             <a:r>
-              <a:rPr lang="en-US" smtClean="0"/>
+              <a:rPr lang="en-US"/>
               <a:t>Second level</a:t>
             </a:r>
           </a:p>
           <a:p>
             <a:pPr lvl="2"/>
             <a:r>
-              <a:rPr lang="en-US" smtClean="0"/>
+              <a:rPr lang="en-US"/>
               <a:t>Third level</a:t>
             </a:r>
           </a:p>
           <a:p>
             <a:pPr lvl="3"/>
             <a:r>
-              <a:rPr lang="en-US" smtClean="0"/>
+              <a:rPr lang="en-US"/>
               <a:t>Fourth level</a:t>
             </a:r>
           </a:p>
           <a:p>
             <a:pPr lvl="4"/>
             <a:r>
-              <a:rPr lang="en-US" smtClean="0"/>
+              <a:rPr lang="en-US"/>
               <a:t>Fifth level</a:t>
             </a:r>
-            <a:endParaRPr lang="en-US"/>
           </a:p>
         </p:txBody>
       </p:sp>
@@ -3768,7 +3782,7 @@
             <a:fld id="{1D8BD707-D9CF-40AE-B4C6-C98DA3205C09}" type="datetimeFigureOut">
               <a:rPr lang="en-US" smtClean="0"/>
               <a:pPr/>
-              <a:t>8/1/2011</a:t>
+              <a:t>9/16/24</a:t>
             </a:fld>
             <a:endParaRPr lang="en-US"/>
           </a:p>
@@ -4123,7 +4137,7 @@
 </file>
 
 <file path=ppt/slides/slide1.xml><?xml version="1.0" encoding="utf-8"?>
-<p:sld xmlns:p="http://schemas.openxmlformats.org/presentationml/2006/main" xmlns:a="http://schemas.openxmlformats.org/drawingml/2006/main" xmlns:r="http://schemas.openxmlformats.org/officeDocument/2006/relationships">
+<p:sld xmlns:a="http://schemas.openxmlformats.org/drawingml/2006/main" xmlns:r="http://schemas.openxmlformats.org/officeDocument/2006/relationships" xmlns:p="http://schemas.openxmlformats.org/presentationml/2006/main">
   <p:cSld>
     <p:spTree>
       <p:nvGrpSpPr>
@@ -4141,12 +4155,12 @@
       </p:grpSpPr>
       <p:sp>
         <p:nvSpPr>
-          <p:cNvPr name="Freeform 2" id="2"/>
+          <p:cNvPr id="2" name="Freeform 2"/>
           <p:cNvSpPr/>
           <p:nvPr/>
         </p:nvSpPr>
         <p:spPr>
-          <a:xfrm flipH="true" flipV="true" rot="0">
+          <a:xfrm flipH="1" flipV="1">
             <a:off x="0" y="0"/>
             <a:ext cx="18288000" cy="10287000"/>
           </a:xfrm>
@@ -4155,9 +4169,9 @@
             <a:gdLst/>
             <a:ahLst/>
             <a:cxnLst/>
-            <a:rect r="r" b="b" t="t" l="l"/>
+            <a:rect l="l" t="t" r="r" b="b"/>
             <a:pathLst>
-              <a:path h="10287000" w="18288000">
+              <a:path w="18288000" h="10287000">
                 <a:moveTo>
                   <a:pt x="18288000" y="10287000"/>
                 </a:moveTo>
@@ -4180,19 +4194,26 @@
           <a:blipFill>
             <a:blip r:embed="rId2"/>
             <a:stretch>
-              <a:fillRect l="0" t="-38888" r="0" b="-38888"/>
+              <a:fillRect t="-38888" b="-38888"/>
             </a:stretch>
           </a:blipFill>
         </p:spPr>
-      </p:sp>
-      <p:sp>
-        <p:nvSpPr>
-          <p:cNvPr name="Freeform 3" id="3"/>
+        <p:txBody>
+          <a:bodyPr/>
+          <a:lstStyle/>
+          <a:p>
+            <a:endParaRPr lang="en-SE"/>
+          </a:p>
+        </p:txBody>
+      </p:sp>
+      <p:sp>
+        <p:nvSpPr>
+          <p:cNvPr id="3" name="Freeform 3"/>
           <p:cNvSpPr/>
           <p:nvPr/>
         </p:nvSpPr>
         <p:spPr>
-          <a:xfrm flipH="false" flipV="false" rot="7659121">
+          <a:xfrm rot="7659121">
             <a:off x="15091031" y="5585714"/>
             <a:ext cx="7629294" cy="7828566"/>
           </a:xfrm>
@@ -4201,9 +4222,9 @@
             <a:gdLst/>
             <a:ahLst/>
             <a:cxnLst/>
-            <a:rect r="r" b="b" t="t" l="l"/>
+            <a:rect l="l" t="t" r="r" b="b"/>
             <a:pathLst>
-              <a:path h="7828566" w="7629294">
+              <a:path w="7629294" h="7828566">
                 <a:moveTo>
                   <a:pt x="0" y="0"/>
                 </a:moveTo>
@@ -4232,19 +4253,26 @@
               </a:extLst>
             </a:blip>
             <a:stretch>
-              <a:fillRect l="0" t="0" r="0" b="0"/>
+              <a:fillRect/>
             </a:stretch>
           </a:blipFill>
         </p:spPr>
-      </p:sp>
-      <p:sp>
-        <p:nvSpPr>
-          <p:cNvPr name="Freeform 4" id="4"/>
+        <p:txBody>
+          <a:bodyPr/>
+          <a:lstStyle/>
+          <a:p>
+            <a:endParaRPr lang="en-SE"/>
+          </a:p>
+        </p:txBody>
+      </p:sp>
+      <p:sp>
+        <p:nvSpPr>
+          <p:cNvPr id="4" name="Freeform 4"/>
           <p:cNvSpPr/>
           <p:nvPr/>
         </p:nvSpPr>
         <p:spPr>
-          <a:xfrm flipH="false" flipV="false" rot="0">
+          <a:xfrm>
             <a:off x="-3258071" y="-4629150"/>
             <a:ext cx="9022634" cy="9258300"/>
           </a:xfrm>
@@ -4253,9 +4281,9 @@
             <a:gdLst/>
             <a:ahLst/>
             <a:cxnLst/>
-            <a:rect r="r" b="b" t="t" l="l"/>
+            <a:rect l="l" t="t" r="r" b="b"/>
             <a:pathLst>
-              <a:path h="9258300" w="9022634">
+              <a:path w="9022634" h="9258300">
                 <a:moveTo>
                   <a:pt x="0" y="0"/>
                 </a:moveTo>
@@ -4284,19 +4312,26 @@
               </a:extLst>
             </a:blip>
             <a:stretch>
-              <a:fillRect l="0" t="0" r="0" b="0"/>
+              <a:fillRect/>
             </a:stretch>
           </a:blipFill>
         </p:spPr>
+        <p:txBody>
+          <a:bodyPr/>
+          <a:lstStyle/>
+          <a:p>
+            <a:endParaRPr lang="en-SE"/>
+          </a:p>
+        </p:txBody>
       </p:sp>
       <p:grpSp>
         <p:nvGrpSpPr>
-          <p:cNvPr name="Group 5" id="5"/>
+          <p:cNvPr id="5" name="Group 5"/>
           <p:cNvGrpSpPr/>
           <p:nvPr/>
         </p:nvGrpSpPr>
         <p:grpSpPr>
-          <a:xfrm rot="0">
+          <a:xfrm>
             <a:off x="4236347" y="3202251"/>
             <a:ext cx="9815307" cy="4208864"/>
             <a:chOff x="0" y="0"/>
@@ -4305,12 +4340,12 @@
         </p:grpSpPr>
         <p:sp>
           <p:nvSpPr>
-            <p:cNvPr name="Freeform 6" id="6"/>
+            <p:cNvPr id="6" name="Freeform 6"/>
             <p:cNvSpPr/>
             <p:nvPr/>
           </p:nvSpPr>
           <p:spPr>
-            <a:xfrm flipH="false" flipV="false" rot="0">
+            <a:xfrm>
               <a:off x="0" y="0"/>
               <a:ext cx="1895495" cy="812800"/>
             </a:xfrm>
@@ -4319,9 +4354,9 @@
               <a:gdLst/>
               <a:ahLst/>
               <a:cxnLst/>
-              <a:rect r="r" b="b" t="t" l="l"/>
+              <a:rect l="l" t="t" r="r" b="b"/>
               <a:pathLst>
-                <a:path h="812800" w="1895495">
+                <a:path w="1895495" h="812800">
                   <a:moveTo>
                     <a:pt x="0" y="0"/>
                   </a:moveTo>
@@ -4351,11 +4386,18 @@
               <a:miter/>
             </a:ln>
           </p:spPr>
+          <p:txBody>
+            <a:bodyPr/>
+            <a:lstStyle/>
+            <a:p>
+              <a:endParaRPr lang="en-SE"/>
+            </a:p>
+          </p:txBody>
         </p:sp>
         <p:sp>
           <p:nvSpPr>
-            <p:cNvPr name="TextBox 7" id="7"/>
-            <p:cNvSpPr txBox="true"/>
+            <p:cNvPr id="7" name="TextBox 7"/>
+            <p:cNvSpPr txBox="1"/>
             <p:nvPr/>
           </p:nvSpPr>
           <p:spPr>
@@ -4368,7 +4410,7 @@
             </a:prstGeom>
           </p:spPr>
           <p:txBody>
-            <a:bodyPr anchor="ctr" rtlCol="false" tIns="50800" lIns="50800" bIns="50800" rIns="50800"/>
+            <a:bodyPr lIns="50800" tIns="50800" rIns="50800" bIns="50800" rtlCol="0" anchor="ctr"/>
             <a:lstStyle/>
             <a:p>
               <a:pPr algn="ctr">
@@ -4376,18 +4418,19 @@
                   <a:spcPts val="2859"/>
                 </a:lnSpc>
               </a:pPr>
+              <a:endParaRPr/>
             </a:p>
           </p:txBody>
         </p:sp>
       </p:grpSp>
       <p:sp>
         <p:nvSpPr>
-          <p:cNvPr name="TextBox 8" id="8"/>
-          <p:cNvSpPr txBox="true"/>
+          <p:cNvPr id="8" name="TextBox 8"/>
+          <p:cNvSpPr txBox="1"/>
           <p:nvPr/>
         </p:nvSpPr>
         <p:spPr>
-          <a:xfrm rot="0">
+          <a:xfrm>
             <a:off x="4115585" y="3097476"/>
             <a:ext cx="9660683" cy="4313639"/>
           </a:xfrm>
@@ -4396,7 +4439,7 @@
           </a:prstGeom>
         </p:spPr>
         <p:txBody>
-          <a:bodyPr anchor="t" rtlCol="false" tIns="0" lIns="0" bIns="0" rIns="0">
+          <a:bodyPr lIns="0" tIns="0" rIns="0" bIns="0" rtlCol="0" anchor="t">
             <a:spAutoFit/>
           </a:bodyPr>
           <a:lstStyle/>
@@ -4407,7 +4450,7 @@
               </a:lnSpc>
             </a:pPr>
             <a:r>
-              <a:rPr lang="en-US" b="true" sz="6211" spc="608">
+              <a:rPr lang="en-US" sz="6211" b="1" spc="608">
                 <a:solidFill>
                   <a:srgbClr val="231F20"/>
                 </a:solidFill>
@@ -4423,12 +4466,12 @@
       </p:sp>
       <p:sp>
         <p:nvSpPr>
-          <p:cNvPr name="TextBox 9" id="9"/>
-          <p:cNvSpPr txBox="true"/>
+          <p:cNvPr id="9" name="TextBox 9"/>
+          <p:cNvSpPr txBox="1"/>
           <p:nvPr/>
         </p:nvSpPr>
         <p:spPr>
-          <a:xfrm rot="0">
+          <a:xfrm>
             <a:off x="2719596" y="7482578"/>
             <a:ext cx="12848809" cy="441638"/>
           </a:xfrm>
@@ -4437,7 +4480,7 @@
           </a:prstGeom>
         </p:spPr>
         <p:txBody>
-          <a:bodyPr anchor="t" rtlCol="false" tIns="0" lIns="0" bIns="0" rIns="0">
+          <a:bodyPr lIns="0" tIns="0" rIns="0" bIns="0" rtlCol="0" anchor="t">
             <a:spAutoFit/>
           </a:bodyPr>
           <a:lstStyle/>
@@ -4448,7 +4491,7 @@
               </a:lnSpc>
             </a:pPr>
             <a:r>
-              <a:rPr lang="en-US" b="true" sz="2653" spc="140">
+              <a:rPr lang="en-US" sz="2653" b="1" spc="140">
                 <a:solidFill>
                   <a:srgbClr val="231F20"/>
                 </a:solidFill>
@@ -4464,12 +4507,12 @@
       </p:sp>
       <p:sp>
         <p:nvSpPr>
-          <p:cNvPr name="TextBox 10" id="10"/>
-          <p:cNvSpPr txBox="true"/>
+          <p:cNvPr id="10" name="TextBox 10"/>
+          <p:cNvSpPr txBox="1"/>
           <p:nvPr/>
         </p:nvSpPr>
         <p:spPr>
-          <a:xfrm rot="0">
+          <a:xfrm>
             <a:off x="7730870" y="8974119"/>
             <a:ext cx="2912361" cy="284181"/>
           </a:xfrm>
@@ -4478,12 +4521,12 @@
           </a:prstGeom>
         </p:spPr>
         <p:txBody>
-          <a:bodyPr anchor="t" rtlCol="false" tIns="0" lIns="0" bIns="0" rIns="0">
+          <a:bodyPr lIns="0" tIns="0" rIns="0" bIns="0" rtlCol="0" anchor="t">
             <a:spAutoFit/>
           </a:bodyPr>
           <a:lstStyle/>
           <a:p>
-            <a:pPr algn="ctr" marL="0" indent="0" lvl="0">
+            <a:pPr marL="0" lvl="0" indent="0" algn="ctr">
               <a:lnSpc>
                 <a:spcPts val="2394"/>
               </a:lnSpc>
@@ -4492,7 +4535,7 @@
               </a:spcBef>
             </a:pPr>
             <a:r>
-              <a:rPr lang="en-US" b="true" sz="1735" spc="170">
+              <a:rPr lang="en-US" sz="1735" b="1" spc="170">
                 <a:solidFill>
                   <a:srgbClr val="231F20"/>
                 </a:solidFill>
@@ -4515,13 +4558,14 @@
 </file>
 
 <file path=ppt/slides/slide2.xml><?xml version="1.0" encoding="utf-8"?>
-<p:sld xmlns:p="http://schemas.openxmlformats.org/presentationml/2006/main" xmlns:a="http://schemas.openxmlformats.org/drawingml/2006/main" xmlns:r="http://schemas.openxmlformats.org/officeDocument/2006/relationships">
+<p:sld xmlns:a="http://schemas.openxmlformats.org/drawingml/2006/main" xmlns:r="http://schemas.openxmlformats.org/officeDocument/2006/relationships" xmlns:p="http://schemas.openxmlformats.org/presentationml/2006/main">
   <p:cSld>
     <p:bg>
       <p:bgPr>
         <a:solidFill>
           <a:srgbClr val="F2F4F5"/>
         </a:solidFill>
+        <a:effectLst/>
       </p:bgPr>
     </p:bg>
     <p:spTree>
@@ -4540,12 +4584,12 @@
       </p:grpSpPr>
       <p:sp>
         <p:nvSpPr>
-          <p:cNvPr name="Freeform 2" id="2"/>
+          <p:cNvPr id="2" name="Freeform 2"/>
           <p:cNvSpPr/>
           <p:nvPr/>
         </p:nvSpPr>
         <p:spPr>
-          <a:xfrm flipH="false" flipV="false" rot="7659121">
+          <a:xfrm rot="7659121">
             <a:off x="-4012602" y="5585714"/>
             <a:ext cx="7629294" cy="7828566"/>
           </a:xfrm>
@@ -4554,9 +4598,9 @@
             <a:gdLst/>
             <a:ahLst/>
             <a:cxnLst/>
-            <a:rect r="r" b="b" t="t" l="l"/>
+            <a:rect l="l" t="t" r="r" b="b"/>
             <a:pathLst>
-              <a:path h="7828566" w="7629294">
+              <a:path w="7629294" h="7828566">
                 <a:moveTo>
                   <a:pt x="0" y="0"/>
                 </a:moveTo>
@@ -4585,19 +4629,26 @@
               </a:extLst>
             </a:blip>
             <a:stretch>
-              <a:fillRect l="0" t="0" r="0" b="0"/>
+              <a:fillRect/>
             </a:stretch>
           </a:blipFill>
         </p:spPr>
+        <p:txBody>
+          <a:bodyPr/>
+          <a:lstStyle/>
+          <a:p>
+            <a:endParaRPr lang="en-SE"/>
+          </a:p>
+        </p:txBody>
       </p:sp>
       <p:grpSp>
         <p:nvGrpSpPr>
-          <p:cNvPr name="Group 3" id="3"/>
+          <p:cNvPr id="3" name="Group 3"/>
           <p:cNvGrpSpPr/>
           <p:nvPr/>
         </p:nvGrpSpPr>
         <p:grpSpPr>
-          <a:xfrm rot="0">
+          <a:xfrm>
             <a:off x="4999719" y="3088358"/>
             <a:ext cx="1400485" cy="3649256"/>
             <a:chOff x="0" y="0"/>
@@ -4606,12 +4657,12 @@
         </p:grpSpPr>
         <p:sp>
           <p:nvSpPr>
-            <p:cNvPr name="Freeform 4" id="4"/>
+            <p:cNvPr id="4" name="Freeform 4"/>
             <p:cNvSpPr/>
             <p:nvPr/>
           </p:nvSpPr>
           <p:spPr>
-            <a:xfrm flipH="false" flipV="false" rot="0">
+            <a:xfrm>
               <a:off x="0" y="0"/>
               <a:ext cx="368852" cy="961121"/>
             </a:xfrm>
@@ -4620,9 +4671,9 @@
               <a:gdLst/>
               <a:ahLst/>
               <a:cxnLst/>
-              <a:rect r="r" b="b" t="t" l="l"/>
+              <a:rect l="l" t="t" r="r" b="b"/>
               <a:pathLst>
-                <a:path h="961121" w="368852">
+                <a:path w="368852" h="961121">
                   <a:moveTo>
                     <a:pt x="0" y="0"/>
                   </a:moveTo>
@@ -4643,11 +4694,18 @@
               <a:srgbClr val="CCCCCC"/>
             </a:solidFill>
           </p:spPr>
+          <p:txBody>
+            <a:bodyPr/>
+            <a:lstStyle/>
+            <a:p>
+              <a:endParaRPr lang="en-SE"/>
+            </a:p>
+          </p:txBody>
         </p:sp>
         <p:sp>
           <p:nvSpPr>
-            <p:cNvPr name="TextBox 5" id="5"/>
-            <p:cNvSpPr txBox="true"/>
+            <p:cNvPr id="5" name="TextBox 5"/>
+            <p:cNvSpPr txBox="1"/>
             <p:nvPr/>
           </p:nvSpPr>
           <p:spPr>
@@ -4660,7 +4718,7 @@
             </a:prstGeom>
           </p:spPr>
           <p:txBody>
-            <a:bodyPr anchor="ctr" rtlCol="false" tIns="50800" lIns="50800" bIns="50800" rIns="50800"/>
+            <a:bodyPr lIns="50800" tIns="50800" rIns="50800" bIns="50800" rtlCol="0" anchor="ctr"/>
             <a:lstStyle/>
             <a:p>
               <a:pPr algn="ctr">
@@ -4668,18 +4726,19 @@
                   <a:spcPts val="2859"/>
                 </a:lnSpc>
               </a:pPr>
+              <a:endParaRPr/>
             </a:p>
           </p:txBody>
         </p:sp>
       </p:grpSp>
       <p:sp>
         <p:nvSpPr>
-          <p:cNvPr name="TextBox 6" id="6"/>
-          <p:cNvSpPr txBox="true"/>
+          <p:cNvPr id="6" name="TextBox 6"/>
+          <p:cNvSpPr txBox="1"/>
           <p:nvPr/>
         </p:nvSpPr>
         <p:spPr>
-          <a:xfrm rot="0">
+          <a:xfrm>
             <a:off x="4980992" y="1036994"/>
             <a:ext cx="7416941" cy="1683727"/>
           </a:xfrm>
@@ -4688,7 +4747,7 @@
           </a:prstGeom>
         </p:spPr>
         <p:txBody>
-          <a:bodyPr anchor="t" rtlCol="false" tIns="0" lIns="0" bIns="0" rIns="0">
+          <a:bodyPr lIns="0" tIns="0" rIns="0" bIns="0" rtlCol="0" anchor="t">
             <a:spAutoFit/>
           </a:bodyPr>
           <a:lstStyle/>
@@ -4699,7 +4758,7 @@
               </a:lnSpc>
             </a:pPr>
             <a:r>
-              <a:rPr lang="en-US" b="true" sz="9981" spc="978">
+              <a:rPr lang="en-US" sz="9981" b="1" spc="978">
                 <a:solidFill>
                   <a:srgbClr val="231F20"/>
                 </a:solidFill>
@@ -4715,12 +4774,12 @@
       </p:sp>
       <p:sp>
         <p:nvSpPr>
-          <p:cNvPr name="Freeform 7" id="7"/>
+          <p:cNvPr id="7" name="Freeform 7"/>
           <p:cNvSpPr/>
           <p:nvPr/>
         </p:nvSpPr>
         <p:spPr>
-          <a:xfrm flipH="false" flipV="false" rot="2016048">
+          <a:xfrm rot="2016048">
             <a:off x="12243487" y="-1005305"/>
             <a:ext cx="10749463" cy="2687366"/>
           </a:xfrm>
@@ -4729,9 +4788,9 @@
             <a:gdLst/>
             <a:ahLst/>
             <a:cxnLst/>
-            <a:rect r="r" b="b" t="t" l="l"/>
+            <a:rect l="l" t="t" r="r" b="b"/>
             <a:pathLst>
-              <a:path h="2687366" w="10749463">
+              <a:path w="10749463" h="2687366">
                 <a:moveTo>
                   <a:pt x="0" y="0"/>
                 </a:moveTo>
@@ -4760,19 +4819,26 @@
               </a:extLst>
             </a:blip>
             <a:stretch>
-              <a:fillRect l="0" t="0" r="0" b="0"/>
+              <a:fillRect/>
             </a:stretch>
           </a:blipFill>
         </p:spPr>
-      </p:sp>
-      <p:sp>
-        <p:nvSpPr>
-          <p:cNvPr name="TextBox 8" id="8"/>
-          <p:cNvSpPr txBox="true"/>
+        <p:txBody>
+          <a:bodyPr/>
+          <a:lstStyle/>
+          <a:p>
+            <a:endParaRPr lang="en-SE"/>
+          </a:p>
+        </p:txBody>
+      </p:sp>
+      <p:sp>
+        <p:nvSpPr>
+          <p:cNvPr id="8" name="TextBox 8"/>
+          <p:cNvSpPr txBox="1"/>
           <p:nvPr/>
         </p:nvSpPr>
         <p:spPr>
-          <a:xfrm rot="0">
+          <a:xfrm>
             <a:off x="5231353" y="3225185"/>
             <a:ext cx="937219" cy="657225"/>
           </a:xfrm>
@@ -4781,7 +4847,7 @@
           </a:prstGeom>
         </p:spPr>
         <p:txBody>
-          <a:bodyPr anchor="t" rtlCol="false" tIns="0" lIns="0" bIns="0" rIns="0">
+          <a:bodyPr lIns="0" tIns="0" rIns="0" bIns="0" rtlCol="0" anchor="t">
             <a:spAutoFit/>
           </a:bodyPr>
           <a:lstStyle/>
@@ -4792,7 +4858,7 @@
               </a:lnSpc>
             </a:pPr>
             <a:r>
-              <a:rPr lang="en-US" b="true" sz="4271" i="true">
+              <a:rPr lang="en-US" sz="4271" b="1" i="1">
                 <a:solidFill>
                   <a:srgbClr val="363636"/>
                 </a:solidFill>
@@ -4808,12 +4874,12 @@
       </p:sp>
       <p:sp>
         <p:nvSpPr>
-          <p:cNvPr name="TextBox 9" id="9"/>
-          <p:cNvSpPr txBox="true"/>
+          <p:cNvPr id="9" name="TextBox 9"/>
+          <p:cNvSpPr txBox="1"/>
           <p:nvPr/>
         </p:nvSpPr>
         <p:spPr>
-          <a:xfrm rot="0">
+          <a:xfrm>
             <a:off x="5231353" y="4022304"/>
             <a:ext cx="937219" cy="657225"/>
           </a:xfrm>
@@ -4822,7 +4888,7 @@
           </a:prstGeom>
         </p:spPr>
         <p:txBody>
-          <a:bodyPr anchor="t" rtlCol="false" tIns="0" lIns="0" bIns="0" rIns="0">
+          <a:bodyPr lIns="0" tIns="0" rIns="0" bIns="0" rtlCol="0" anchor="t">
             <a:spAutoFit/>
           </a:bodyPr>
           <a:lstStyle/>
@@ -4833,7 +4899,7 @@
               </a:lnSpc>
             </a:pPr>
             <a:r>
-              <a:rPr lang="en-US" b="true" sz="4271" i="true">
+              <a:rPr lang="en-US" sz="4271" b="1" i="1">
                 <a:solidFill>
                   <a:srgbClr val="363636"/>
                 </a:solidFill>
@@ -4849,12 +4915,12 @@
       </p:sp>
       <p:sp>
         <p:nvSpPr>
-          <p:cNvPr name="TextBox 10" id="10"/>
-          <p:cNvSpPr txBox="true"/>
+          <p:cNvPr id="10" name="TextBox 10"/>
+          <p:cNvSpPr txBox="1"/>
           <p:nvPr/>
         </p:nvSpPr>
         <p:spPr>
-          <a:xfrm rot="0">
+          <a:xfrm>
             <a:off x="5231353" y="4903461"/>
             <a:ext cx="937219" cy="657225"/>
           </a:xfrm>
@@ -4863,7 +4929,7 @@
           </a:prstGeom>
         </p:spPr>
         <p:txBody>
-          <a:bodyPr anchor="t" rtlCol="false" tIns="0" lIns="0" bIns="0" rIns="0">
+          <a:bodyPr lIns="0" tIns="0" rIns="0" bIns="0" rtlCol="0" anchor="t">
             <a:spAutoFit/>
           </a:bodyPr>
           <a:lstStyle/>
@@ -4874,7 +4940,7 @@
               </a:lnSpc>
             </a:pPr>
             <a:r>
-              <a:rPr lang="en-US" b="true" sz="4271" i="true">
+              <a:rPr lang="en-US" sz="4271" b="1" i="1">
                 <a:solidFill>
                   <a:srgbClr val="363636"/>
                 </a:solidFill>
@@ -4890,12 +4956,12 @@
       </p:sp>
       <p:sp>
         <p:nvSpPr>
-          <p:cNvPr name="TextBox 11" id="11"/>
-          <p:cNvSpPr txBox="true"/>
+          <p:cNvPr id="11" name="TextBox 11"/>
+          <p:cNvSpPr txBox="1"/>
           <p:nvPr/>
         </p:nvSpPr>
         <p:spPr>
-          <a:xfrm rot="0">
+          <a:xfrm>
             <a:off x="5231353" y="5700580"/>
             <a:ext cx="937219" cy="657225"/>
           </a:xfrm>
@@ -4904,7 +4970,7 @@
           </a:prstGeom>
         </p:spPr>
         <p:txBody>
-          <a:bodyPr anchor="t" rtlCol="false" tIns="0" lIns="0" bIns="0" rIns="0">
+          <a:bodyPr lIns="0" tIns="0" rIns="0" bIns="0" rtlCol="0" anchor="t">
             <a:spAutoFit/>
           </a:bodyPr>
           <a:lstStyle/>
@@ -4915,7 +4981,7 @@
               </a:lnSpc>
             </a:pPr>
             <a:r>
-              <a:rPr lang="en-US" b="true" sz="4271" i="true">
+              <a:rPr lang="en-US" sz="4271" b="1" i="1">
                 <a:solidFill>
                   <a:srgbClr val="363636"/>
                 </a:solidFill>
@@ -4931,12 +4997,12 @@
       </p:sp>
       <p:sp>
         <p:nvSpPr>
-          <p:cNvPr name="TextBox 12" id="12"/>
-          <p:cNvSpPr txBox="true"/>
+          <p:cNvPr id="12" name="TextBox 12"/>
+          <p:cNvSpPr txBox="1"/>
           <p:nvPr/>
         </p:nvSpPr>
         <p:spPr>
-          <a:xfrm rot="0">
+          <a:xfrm>
             <a:off x="6607430" y="3333137"/>
             <a:ext cx="5790503" cy="418548"/>
           </a:xfrm>
@@ -4945,7 +5011,7 @@
           </a:prstGeom>
         </p:spPr>
         <p:txBody>
-          <a:bodyPr anchor="t" rtlCol="false" tIns="0" lIns="0" bIns="0" rIns="0">
+          <a:bodyPr lIns="0" tIns="0" rIns="0" bIns="0" rtlCol="0" anchor="t">
             <a:spAutoFit/>
           </a:bodyPr>
           <a:lstStyle/>
@@ -4972,12 +5038,12 @@
       </p:sp>
       <p:sp>
         <p:nvSpPr>
-          <p:cNvPr name="TextBox 13" id="13"/>
-          <p:cNvSpPr txBox="true"/>
+          <p:cNvPr id="13" name="TextBox 13"/>
+          <p:cNvSpPr txBox="1"/>
           <p:nvPr/>
         </p:nvSpPr>
         <p:spPr>
-          <a:xfrm rot="0">
+          <a:xfrm>
             <a:off x="6607430" y="4127355"/>
             <a:ext cx="6076629" cy="418548"/>
           </a:xfrm>
@@ -4986,7 +5052,7 @@
           </a:prstGeom>
         </p:spPr>
         <p:txBody>
-          <a:bodyPr anchor="t" rtlCol="false" tIns="0" lIns="0" bIns="0" rIns="0">
+          <a:bodyPr lIns="0" tIns="0" rIns="0" bIns="0" rtlCol="0" anchor="t">
             <a:spAutoFit/>
           </a:bodyPr>
           <a:lstStyle/>
@@ -5013,12 +5079,12 @@
       </p:sp>
       <p:sp>
         <p:nvSpPr>
-          <p:cNvPr name="TextBox 14" id="14"/>
-          <p:cNvSpPr txBox="true"/>
+          <p:cNvPr id="14" name="TextBox 14"/>
+          <p:cNvSpPr txBox="1"/>
           <p:nvPr/>
         </p:nvSpPr>
         <p:spPr>
-          <a:xfrm rot="0">
+          <a:xfrm>
             <a:off x="6607430" y="5047445"/>
             <a:ext cx="5790503" cy="418548"/>
           </a:xfrm>
@@ -5027,12 +5093,12 @@
           </a:prstGeom>
         </p:spPr>
         <p:txBody>
-          <a:bodyPr anchor="t" rtlCol="false" tIns="0" lIns="0" bIns="0" rIns="0">
+          <a:bodyPr lIns="0" tIns="0" rIns="0" bIns="0" rtlCol="0" anchor="t">
             <a:spAutoFit/>
           </a:bodyPr>
           <a:lstStyle/>
           <a:p>
-            <a:pPr algn="l" marL="0" indent="0" lvl="0">
+            <a:pPr marL="0" lvl="0" indent="0" algn="l">
               <a:lnSpc>
                 <a:spcPts val="3483"/>
               </a:lnSpc>
@@ -5057,12 +5123,12 @@
       </p:sp>
       <p:sp>
         <p:nvSpPr>
-          <p:cNvPr name="TextBox 15" id="15"/>
-          <p:cNvSpPr txBox="true"/>
+          <p:cNvPr id="15" name="TextBox 15"/>
+          <p:cNvSpPr txBox="1"/>
           <p:nvPr/>
         </p:nvSpPr>
         <p:spPr>
-          <a:xfrm rot="0">
+          <a:xfrm>
             <a:off x="6607430" y="5841663"/>
             <a:ext cx="6076629" cy="418548"/>
           </a:xfrm>
@@ -5071,12 +5137,12 @@
           </a:prstGeom>
         </p:spPr>
         <p:txBody>
-          <a:bodyPr anchor="t" rtlCol="false" tIns="0" lIns="0" bIns="0" rIns="0">
+          <a:bodyPr lIns="0" tIns="0" rIns="0" bIns="0" rtlCol="0" anchor="t">
             <a:spAutoFit/>
           </a:bodyPr>
           <a:lstStyle/>
           <a:p>
-            <a:pPr algn="l" marL="0" indent="0" lvl="0">
+            <a:pPr marL="0" lvl="0" indent="0" algn="l">
               <a:lnSpc>
                 <a:spcPts val="3483"/>
               </a:lnSpc>
@@ -5108,7 +5174,7 @@
 </file>
 
 <file path=ppt/slides/slide3.xml><?xml version="1.0" encoding="utf-8"?>
-<p:sld xmlns:p="http://schemas.openxmlformats.org/presentationml/2006/main" xmlns:a="http://schemas.openxmlformats.org/drawingml/2006/main" xmlns:r="http://schemas.openxmlformats.org/officeDocument/2006/relationships">
+<p:sld xmlns:a="http://schemas.openxmlformats.org/drawingml/2006/main" xmlns:r="http://schemas.openxmlformats.org/officeDocument/2006/relationships" xmlns:p="http://schemas.openxmlformats.org/presentationml/2006/main">
   <p:cSld>
     <p:spTree>
       <p:nvGrpSpPr>
@@ -5126,12 +5192,12 @@
       </p:grpSpPr>
       <p:sp>
         <p:nvSpPr>
-          <p:cNvPr name="Freeform 2" id="2"/>
+          <p:cNvPr id="2" name="Freeform 2"/>
           <p:cNvSpPr/>
           <p:nvPr/>
         </p:nvSpPr>
         <p:spPr>
-          <a:xfrm flipH="true" flipV="true" rot="0">
+          <a:xfrm flipH="1" flipV="1">
             <a:off x="0" y="0"/>
             <a:ext cx="18288000" cy="10287000"/>
           </a:xfrm>
@@ -5140,9 +5206,9 @@
             <a:gdLst/>
             <a:ahLst/>
             <a:cxnLst/>
-            <a:rect r="r" b="b" t="t" l="l"/>
+            <a:rect l="l" t="t" r="r" b="b"/>
             <a:pathLst>
-              <a:path h="10287000" w="18288000">
+              <a:path w="18288000" h="10287000">
                 <a:moveTo>
                   <a:pt x="18288000" y="10287000"/>
                 </a:moveTo>
@@ -5165,19 +5231,26 @@
           <a:blipFill>
             <a:blip r:embed="rId2"/>
             <a:stretch>
-              <a:fillRect l="0" t="-38888" r="0" b="-38888"/>
+              <a:fillRect t="-38888" b="-38888"/>
             </a:stretch>
           </a:blipFill>
         </p:spPr>
-      </p:sp>
-      <p:sp>
-        <p:nvSpPr>
-          <p:cNvPr name="Freeform 3" id="3"/>
+        <p:txBody>
+          <a:bodyPr/>
+          <a:lstStyle/>
+          <a:p>
+            <a:endParaRPr lang="en-SE"/>
+          </a:p>
+        </p:txBody>
+      </p:sp>
+      <p:sp>
+        <p:nvSpPr>
+          <p:cNvPr id="3" name="Freeform 3"/>
           <p:cNvSpPr/>
           <p:nvPr/>
         </p:nvSpPr>
         <p:spPr>
-          <a:xfrm flipH="false" flipV="false" rot="0">
+          <a:xfrm>
             <a:off x="2142191" y="4828880"/>
             <a:ext cx="9752965" cy="1032847"/>
           </a:xfrm>
@@ -5186,9 +5259,9 @@
             <a:gdLst/>
             <a:ahLst/>
             <a:cxnLst/>
-            <a:rect r="r" b="b" t="t" l="l"/>
+            <a:rect l="l" t="t" r="r" b="b"/>
             <a:pathLst>
-              <a:path h="1032847" w="9752965">
+              <a:path w="9752965" h="1032847">
                 <a:moveTo>
                   <a:pt x="0" y="0"/>
                 </a:moveTo>
@@ -5211,19 +5284,26 @@
           <a:blipFill>
             <a:blip r:embed="rId3"/>
             <a:stretch>
-              <a:fillRect l="0" t="-86495" r="0" b="0"/>
+              <a:fillRect t="-86495"/>
             </a:stretch>
           </a:blipFill>
         </p:spPr>
+        <p:txBody>
+          <a:bodyPr/>
+          <a:lstStyle/>
+          <a:p>
+            <a:endParaRPr lang="en-SE"/>
+          </a:p>
+        </p:txBody>
       </p:sp>
       <p:grpSp>
         <p:nvGrpSpPr>
-          <p:cNvPr name="Group 4" id="4"/>
+          <p:cNvPr id="4" name="Group 4"/>
           <p:cNvGrpSpPr/>
           <p:nvPr/>
         </p:nvGrpSpPr>
         <p:grpSpPr>
-          <a:xfrm rot="0">
+          <a:xfrm>
             <a:off x="2142191" y="3714547"/>
             <a:ext cx="10800440" cy="3626771"/>
             <a:chOff x="0" y="0"/>
@@ -5232,12 +5312,12 @@
         </p:grpSpPr>
         <p:sp>
           <p:nvSpPr>
-            <p:cNvPr name="Freeform 5" id="5"/>
+            <p:cNvPr id="5" name="Freeform 5"/>
             <p:cNvSpPr/>
             <p:nvPr/>
           </p:nvSpPr>
           <p:spPr>
-            <a:xfrm flipH="false" flipV="false" rot="0">
+            <a:xfrm>
               <a:off x="0" y="0"/>
               <a:ext cx="4138116" cy="1389573"/>
             </a:xfrm>
@@ -5246,9 +5326,9 @@
               <a:gdLst/>
               <a:ahLst/>
               <a:cxnLst/>
-              <a:rect r="r" b="b" t="t" l="l"/>
+              <a:rect l="l" t="t" r="r" b="b"/>
               <a:pathLst>
-                <a:path h="1389573" w="4138116">
+                <a:path w="4138116" h="1389573">
                   <a:moveTo>
                     <a:pt x="0" y="0"/>
                   </a:moveTo>
@@ -5269,11 +5349,18 @@
               <a:srgbClr val="EFEFEF"/>
             </a:solidFill>
           </p:spPr>
+          <p:txBody>
+            <a:bodyPr/>
+            <a:lstStyle/>
+            <a:p>
+              <a:endParaRPr lang="en-SE"/>
+            </a:p>
+          </p:txBody>
         </p:sp>
         <p:sp>
           <p:nvSpPr>
-            <p:cNvPr name="TextBox 6" id="6"/>
-            <p:cNvSpPr txBox="true"/>
+            <p:cNvPr id="6" name="TextBox 6"/>
+            <p:cNvSpPr txBox="1"/>
             <p:nvPr/>
           </p:nvSpPr>
           <p:spPr>
@@ -5286,7 +5373,7 @@
             </a:prstGeom>
           </p:spPr>
           <p:txBody>
-            <a:bodyPr anchor="ctr" rtlCol="false" tIns="50800" lIns="50800" bIns="50800" rIns="50800"/>
+            <a:bodyPr lIns="50800" tIns="50800" rIns="50800" bIns="50800" rtlCol="0" anchor="ctr"/>
             <a:lstStyle/>
             <a:p>
               <a:pPr algn="ctr">
@@ -5294,18 +5381,19 @@
                   <a:spcPts val="2859"/>
                 </a:lnSpc>
               </a:pPr>
+              <a:endParaRPr/>
             </a:p>
           </p:txBody>
         </p:sp>
       </p:grpSp>
       <p:sp>
         <p:nvSpPr>
-          <p:cNvPr name="Freeform 7" id="7"/>
+          <p:cNvPr id="7" name="Freeform 7"/>
           <p:cNvSpPr/>
           <p:nvPr/>
         </p:nvSpPr>
         <p:spPr>
-          <a:xfrm flipH="false" flipV="false" rot="0">
+          <a:xfrm>
             <a:off x="2474235" y="4171583"/>
             <a:ext cx="1156649" cy="1173721"/>
           </a:xfrm>
@@ -5314,9 +5402,9 @@
             <a:gdLst/>
             <a:ahLst/>
             <a:cxnLst/>
-            <a:rect r="r" b="b" t="t" l="l"/>
+            <a:rect l="l" t="t" r="r" b="b"/>
             <a:pathLst>
-              <a:path h="1173721" w="1156649">
+              <a:path w="1156649" h="1173721">
                 <a:moveTo>
                   <a:pt x="0" y="0"/>
                 </a:moveTo>
@@ -5345,19 +5433,26 @@
               </a:extLst>
             </a:blip>
             <a:stretch>
-              <a:fillRect l="0" t="0" r="0" b="0"/>
+              <a:fillRect/>
             </a:stretch>
           </a:blipFill>
         </p:spPr>
-      </p:sp>
-      <p:sp>
-        <p:nvSpPr>
-          <p:cNvPr name="Freeform 8" id="8"/>
+        <p:txBody>
+          <a:bodyPr/>
+          <a:lstStyle/>
+          <a:p>
+            <a:endParaRPr lang="en-SE"/>
+          </a:p>
+        </p:txBody>
+      </p:sp>
+      <p:sp>
+        <p:nvSpPr>
+          <p:cNvPr id="8" name="Freeform 8"/>
           <p:cNvSpPr/>
           <p:nvPr/>
         </p:nvSpPr>
         <p:spPr>
-          <a:xfrm flipH="false" flipV="false" rot="0">
+          <a:xfrm>
             <a:off x="2142191" y="7210022"/>
             <a:ext cx="9752965" cy="1032847"/>
           </a:xfrm>
@@ -5366,9 +5461,9 @@
             <a:gdLst/>
             <a:ahLst/>
             <a:cxnLst/>
-            <a:rect r="r" b="b" t="t" l="l"/>
+            <a:rect l="l" t="t" r="r" b="b"/>
             <a:pathLst>
-              <a:path h="1032847" w="9752965">
+              <a:path w="9752965" h="1032847">
                 <a:moveTo>
                   <a:pt x="0" y="0"/>
                 </a:moveTo>
@@ -5391,19 +5486,26 @@
           <a:blipFill>
             <a:blip r:embed="rId3"/>
             <a:stretch>
-              <a:fillRect l="0" t="-86495" r="0" b="0"/>
+              <a:fillRect t="-86495"/>
             </a:stretch>
           </a:blipFill>
         </p:spPr>
-      </p:sp>
-      <p:sp>
-        <p:nvSpPr>
-          <p:cNvPr name="TextBox 9" id="9"/>
-          <p:cNvSpPr txBox="true"/>
+        <p:txBody>
+          <a:bodyPr/>
+          <a:lstStyle/>
+          <a:p>
+            <a:endParaRPr lang="en-SE"/>
+          </a:p>
+        </p:txBody>
+      </p:sp>
+      <p:sp>
+        <p:nvSpPr>
+          <p:cNvPr id="9" name="TextBox 9"/>
+          <p:cNvSpPr txBox="1"/>
           <p:nvPr/>
         </p:nvSpPr>
         <p:spPr>
-          <a:xfrm rot="0">
+          <a:xfrm>
             <a:off x="601733" y="920155"/>
             <a:ext cx="9332639" cy="1542701"/>
           </a:xfrm>
@@ -5412,7 +5514,7 @@
           </a:prstGeom>
         </p:spPr>
         <p:txBody>
-          <a:bodyPr anchor="t" rtlCol="false" tIns="0" lIns="0" bIns="0" rIns="0">
+          <a:bodyPr lIns="0" tIns="0" rIns="0" bIns="0" rtlCol="0" anchor="t">
             <a:spAutoFit/>
           </a:bodyPr>
           <a:lstStyle/>
@@ -5423,7 +5525,7 @@
               </a:lnSpc>
             </a:pPr>
             <a:r>
-              <a:rPr lang="en-US" b="true" sz="9181" spc="899">
+              <a:rPr lang="en-US" sz="9181" b="1" spc="899">
                 <a:solidFill>
                   <a:srgbClr val="231F20"/>
                 </a:solidFill>
@@ -5439,12 +5541,12 @@
       </p:sp>
       <p:sp>
         <p:nvSpPr>
-          <p:cNvPr name="TextBox 10" id="10"/>
-          <p:cNvSpPr txBox="true"/>
+          <p:cNvPr id="10" name="TextBox 10"/>
+          <p:cNvSpPr txBox="1"/>
           <p:nvPr/>
         </p:nvSpPr>
         <p:spPr>
-          <a:xfrm rot="0">
+          <a:xfrm>
             <a:off x="3908899" y="3942879"/>
             <a:ext cx="7986258" cy="3122483"/>
           </a:xfrm>
@@ -5453,12 +5555,12 @@
           </a:prstGeom>
         </p:spPr>
         <p:txBody>
-          <a:bodyPr anchor="t" rtlCol="false" tIns="0" lIns="0" bIns="0" rIns="0">
+          <a:bodyPr lIns="0" tIns="0" rIns="0" bIns="0" rtlCol="0" anchor="t">
             <a:spAutoFit/>
           </a:bodyPr>
           <a:lstStyle/>
           <a:p>
-            <a:pPr algn="l" marL="0" indent="0" lvl="0">
+            <a:pPr marL="0" lvl="0" indent="0" algn="l">
               <a:lnSpc>
                 <a:spcPts val="3553"/>
               </a:lnSpc>
@@ -5483,12 +5585,12 @@
       </p:sp>
       <p:sp>
         <p:nvSpPr>
-          <p:cNvPr name="Freeform 11" id="11"/>
+          <p:cNvPr id="11" name="Freeform 11"/>
           <p:cNvSpPr/>
           <p:nvPr/>
         </p:nvSpPr>
         <p:spPr>
-          <a:xfrm flipH="false" flipV="false" rot="0">
+          <a:xfrm>
             <a:off x="-2779578" y="7341318"/>
             <a:ext cx="7616557" cy="7815497"/>
           </a:xfrm>
@@ -5497,9 +5599,9 @@
             <a:gdLst/>
             <a:ahLst/>
             <a:cxnLst/>
-            <a:rect r="r" b="b" t="t" l="l"/>
+            <a:rect l="l" t="t" r="r" b="b"/>
             <a:pathLst>
-              <a:path h="7815497" w="7616557">
+              <a:path w="7616557" h="7815497">
                 <a:moveTo>
                   <a:pt x="0" y="0"/>
                 </a:moveTo>
@@ -5528,19 +5630,26 @@
               </a:extLst>
             </a:blip>
             <a:stretch>
-              <a:fillRect l="0" t="0" r="0" b="0"/>
+              <a:fillRect/>
             </a:stretch>
           </a:blipFill>
         </p:spPr>
-      </p:sp>
-      <p:sp>
-        <p:nvSpPr>
-          <p:cNvPr name="Freeform 12" id="12"/>
+        <p:txBody>
+          <a:bodyPr/>
+          <a:lstStyle/>
+          <a:p>
+            <a:endParaRPr lang="en-SE"/>
+          </a:p>
+        </p:txBody>
+      </p:sp>
+      <p:sp>
+        <p:nvSpPr>
+          <p:cNvPr id="12" name="Freeform 12"/>
           <p:cNvSpPr/>
           <p:nvPr/>
         </p:nvSpPr>
         <p:spPr>
-          <a:xfrm flipH="false" flipV="false" rot="0">
+          <a:xfrm>
             <a:off x="12942631" y="-2265104"/>
             <a:ext cx="7616557" cy="7815497"/>
           </a:xfrm>
@@ -5549,9 +5658,9 @@
             <a:gdLst/>
             <a:ahLst/>
             <a:cxnLst/>
-            <a:rect r="r" b="b" t="t" l="l"/>
+            <a:rect l="l" t="t" r="r" b="b"/>
             <a:pathLst>
-              <a:path h="7815497" w="7616557">
+              <a:path w="7616557" h="7815497">
                 <a:moveTo>
                   <a:pt x="0" y="0"/>
                 </a:moveTo>
@@ -5580,10 +5689,17 @@
               </a:extLst>
             </a:blip>
             <a:stretch>
-              <a:fillRect l="0" t="0" r="0" b="0"/>
+              <a:fillRect/>
             </a:stretch>
           </a:blipFill>
         </p:spPr>
+        <p:txBody>
+          <a:bodyPr/>
+          <a:lstStyle/>
+          <a:p>
+            <a:endParaRPr lang="en-SE"/>
+          </a:p>
+        </p:txBody>
       </p:sp>
     </p:spTree>
   </p:cSld>
@@ -5594,7 +5710,7 @@
 </file>
 
 <file path=ppt/slides/slide4.xml><?xml version="1.0" encoding="utf-8"?>
-<p:sld xmlns:p="http://schemas.openxmlformats.org/presentationml/2006/main" xmlns:a="http://schemas.openxmlformats.org/drawingml/2006/main" xmlns:r="http://schemas.openxmlformats.org/officeDocument/2006/relationships">
+<p:sld xmlns:a="http://schemas.openxmlformats.org/drawingml/2006/main" xmlns:r="http://schemas.openxmlformats.org/officeDocument/2006/relationships" xmlns:p="http://schemas.openxmlformats.org/presentationml/2006/main">
   <p:cSld>
     <p:spTree>
       <p:nvGrpSpPr>
@@ -5612,12 +5728,12 @@
       </p:grpSpPr>
       <p:sp>
         <p:nvSpPr>
-          <p:cNvPr name="Freeform 2" id="2"/>
+          <p:cNvPr id="2" name="Freeform 2"/>
           <p:cNvSpPr/>
           <p:nvPr/>
         </p:nvSpPr>
         <p:spPr>
-          <a:xfrm flipH="true" flipV="true" rot="0">
+          <a:xfrm flipH="1" flipV="1">
             <a:off x="0" y="0"/>
             <a:ext cx="18288000" cy="10287000"/>
           </a:xfrm>
@@ -5626,9 +5742,9 @@
             <a:gdLst/>
             <a:ahLst/>
             <a:cxnLst/>
-            <a:rect r="r" b="b" t="t" l="l"/>
+            <a:rect l="l" t="t" r="r" b="b"/>
             <a:pathLst>
-              <a:path h="10287000" w="18288000">
+              <a:path w="18288000" h="10287000">
                 <a:moveTo>
                   <a:pt x="18288000" y="10287000"/>
                 </a:moveTo>
@@ -5651,19 +5767,26 @@
           <a:blipFill>
             <a:blip r:embed="rId2"/>
             <a:stretch>
-              <a:fillRect l="0" t="-38888" r="0" b="-38888"/>
+              <a:fillRect t="-38888" b="-38888"/>
             </a:stretch>
           </a:blipFill>
         </p:spPr>
-      </p:sp>
-      <p:sp>
-        <p:nvSpPr>
-          <p:cNvPr name="Freeform 3" id="3"/>
+        <p:txBody>
+          <a:bodyPr/>
+          <a:lstStyle/>
+          <a:p>
+            <a:endParaRPr lang="en-SE"/>
+          </a:p>
+        </p:txBody>
+      </p:sp>
+      <p:sp>
+        <p:nvSpPr>
+          <p:cNvPr id="3" name="Freeform 3"/>
           <p:cNvSpPr/>
           <p:nvPr/>
         </p:nvSpPr>
         <p:spPr>
-          <a:xfrm flipH="false" flipV="false" rot="0">
+          <a:xfrm>
             <a:off x="2779206" y="1920649"/>
             <a:ext cx="2027545" cy="3080525"/>
           </a:xfrm>
@@ -5672,9 +5795,9 @@
             <a:gdLst/>
             <a:ahLst/>
             <a:cxnLst/>
-            <a:rect r="r" b="b" t="t" l="l"/>
+            <a:rect l="l" t="t" r="r" b="b"/>
             <a:pathLst>
-              <a:path h="3080525" w="2027545">
+              <a:path w="2027545" h="3080525">
                 <a:moveTo>
                   <a:pt x="0" y="0"/>
                 </a:moveTo>
@@ -5703,19 +5826,26 @@
               </a:extLst>
             </a:blip>
             <a:stretch>
-              <a:fillRect l="0" t="0" r="0" b="0"/>
+              <a:fillRect/>
             </a:stretch>
           </a:blipFill>
         </p:spPr>
-      </p:sp>
-      <p:sp>
-        <p:nvSpPr>
-          <p:cNvPr name="Freeform 4" id="4"/>
+        <p:txBody>
+          <a:bodyPr/>
+          <a:lstStyle/>
+          <a:p>
+            <a:endParaRPr lang="en-SE"/>
+          </a:p>
+        </p:txBody>
+      </p:sp>
+      <p:sp>
+        <p:nvSpPr>
+          <p:cNvPr id="4" name="Freeform 4"/>
           <p:cNvSpPr/>
           <p:nvPr/>
         </p:nvSpPr>
         <p:spPr>
-          <a:xfrm flipH="false" flipV="false" rot="2035253">
+          <a:xfrm rot="2035253">
             <a:off x="15331117" y="4817487"/>
             <a:ext cx="7835077" cy="10939025"/>
           </a:xfrm>
@@ -5724,9 +5854,9 @@
             <a:gdLst/>
             <a:ahLst/>
             <a:cxnLst/>
-            <a:rect r="r" b="b" t="t" l="l"/>
+            <a:rect l="l" t="t" r="r" b="b"/>
             <a:pathLst>
-              <a:path h="10939025" w="7835077">
+              <a:path w="7835077" h="10939025">
                 <a:moveTo>
                   <a:pt x="0" y="0"/>
                 </a:moveTo>
@@ -5755,43 +5885,57 @@
               </a:extLst>
             </a:blip>
             <a:stretch>
-              <a:fillRect l="0" t="0" r="0" b="0"/>
+              <a:fillRect/>
             </a:stretch>
           </a:blipFill>
         </p:spPr>
-      </p:sp>
-      <p:sp>
-        <p:nvSpPr>
-          <p:cNvPr name="AutoShape 5" id="5"/>
+        <p:txBody>
+          <a:bodyPr/>
+          <a:lstStyle/>
+          <a:p>
+            <a:endParaRPr lang="en-SE"/>
+          </a:p>
+        </p:txBody>
+      </p:sp>
+      <p:sp>
+        <p:nvSpPr>
+          <p:cNvPr id="5" name="AutoShape 5"/>
           <p:cNvSpPr/>
           <p:nvPr/>
         </p:nvSpPr>
         <p:spPr>
-          <a:xfrm rot="0">
+          <a:xfrm>
             <a:off x="1589541" y="5472067"/>
             <a:ext cx="15108918" cy="0"/>
           </a:xfrm>
           <a:prstGeom prst="line">
             <a:avLst/>
           </a:prstGeom>
-          <a:ln cap="flat" w="38100">
+          <a:ln w="38100" cap="flat">
             <a:solidFill>
               <a:srgbClr val="000000"/>
             </a:solidFill>
             <a:prstDash val="solid"/>
-            <a:headEnd type="none" len="sm" w="sm"/>
-            <a:tailEnd type="none" len="sm" w="sm"/>
+            <a:headEnd type="none" w="sm" len="sm"/>
+            <a:tailEnd type="none" w="sm" len="sm"/>
           </a:ln>
         </p:spPr>
+        <p:txBody>
+          <a:bodyPr/>
+          <a:lstStyle/>
+          <a:p>
+            <a:endParaRPr lang="en-SE"/>
+          </a:p>
+        </p:txBody>
       </p:sp>
       <p:grpSp>
         <p:nvGrpSpPr>
-          <p:cNvPr name="Group 6" id="6"/>
+          <p:cNvPr id="6" name="Group 6"/>
           <p:cNvGrpSpPr/>
           <p:nvPr/>
         </p:nvGrpSpPr>
         <p:grpSpPr>
-          <a:xfrm rot="0">
+          <a:xfrm>
             <a:off x="3542437" y="5240576"/>
             <a:ext cx="501082" cy="501082"/>
             <a:chOff x="0" y="0"/>
@@ -5800,12 +5944,12 @@
         </p:grpSpPr>
         <p:sp>
           <p:nvSpPr>
-            <p:cNvPr name="Freeform 7" id="7"/>
+            <p:cNvPr id="7" name="Freeform 7"/>
             <p:cNvSpPr/>
             <p:nvPr/>
           </p:nvSpPr>
           <p:spPr>
-            <a:xfrm flipH="false" flipV="false" rot="0">
+            <a:xfrm>
               <a:off x="0" y="0"/>
               <a:ext cx="812800" cy="812800"/>
             </a:xfrm>
@@ -5814,9 +5958,9 @@
               <a:gdLst/>
               <a:ahLst/>
               <a:cxnLst/>
-              <a:rect r="r" b="b" t="t" l="l"/>
+              <a:rect l="l" t="t" r="r" b="b"/>
               <a:pathLst>
-                <a:path h="812800" w="812800">
+                <a:path w="812800" h="812800">
                   <a:moveTo>
                     <a:pt x="406400" y="0"/>
                   </a:moveTo>
@@ -5848,11 +5992,18 @@
               <a:srgbClr val="131211"/>
             </a:solidFill>
           </p:spPr>
+          <p:txBody>
+            <a:bodyPr/>
+            <a:lstStyle/>
+            <a:p>
+              <a:endParaRPr lang="en-SE"/>
+            </a:p>
+          </p:txBody>
         </p:sp>
         <p:sp>
           <p:nvSpPr>
-            <p:cNvPr name="TextBox 8" id="8"/>
-            <p:cNvSpPr txBox="true"/>
+            <p:cNvPr id="8" name="TextBox 8"/>
+            <p:cNvSpPr txBox="1"/>
             <p:nvPr/>
           </p:nvSpPr>
           <p:spPr>
@@ -5865,7 +6016,7 @@
             </a:prstGeom>
           </p:spPr>
           <p:txBody>
-            <a:bodyPr anchor="ctr" rtlCol="false" tIns="50800" lIns="50800" bIns="50800" rIns="50800"/>
+            <a:bodyPr lIns="50800" tIns="50800" rIns="50800" bIns="50800" rtlCol="0" anchor="ctr"/>
             <a:lstStyle/>
             <a:p>
               <a:pPr algn="ctr">
@@ -5873,18 +6024,19 @@
                   <a:spcPts val="2859"/>
                 </a:lnSpc>
               </a:pPr>
+              <a:endParaRPr/>
             </a:p>
           </p:txBody>
         </p:sp>
       </p:grpSp>
       <p:sp>
         <p:nvSpPr>
-          <p:cNvPr name="TextBox 9" id="9"/>
-          <p:cNvSpPr txBox="true"/>
+          <p:cNvPr id="9" name="TextBox 9"/>
+          <p:cNvSpPr txBox="1"/>
           <p:nvPr/>
         </p:nvSpPr>
         <p:spPr>
-          <a:xfrm rot="0">
+          <a:xfrm>
             <a:off x="2190716" y="6537441"/>
             <a:ext cx="3204526" cy="1901627"/>
           </a:xfrm>
@@ -5893,7 +6045,7 @@
           </a:prstGeom>
         </p:spPr>
         <p:txBody>
-          <a:bodyPr anchor="t" rtlCol="false" tIns="0" lIns="0" bIns="0" rIns="0">
+          <a:bodyPr lIns="0" tIns="0" rIns="0" bIns="0" rtlCol="0" anchor="t">
             <a:spAutoFit/>
           </a:bodyPr>
           <a:lstStyle/>
@@ -5920,12 +6072,12 @@
       </p:sp>
       <p:sp>
         <p:nvSpPr>
-          <p:cNvPr name="TextBox 10" id="10"/>
-          <p:cNvSpPr txBox="true"/>
+          <p:cNvPr id="10" name="TextBox 10"/>
+          <p:cNvSpPr txBox="1"/>
           <p:nvPr/>
         </p:nvSpPr>
         <p:spPr>
-          <a:xfrm rot="0">
+          <a:xfrm>
             <a:off x="2779206" y="2339199"/>
             <a:ext cx="2027545" cy="1121713"/>
           </a:xfrm>
@@ -5934,7 +6086,7 @@
           </a:prstGeom>
         </p:spPr>
         <p:txBody>
-          <a:bodyPr anchor="t" rtlCol="false" tIns="0" lIns="0" bIns="0" rIns="0">
+          <a:bodyPr lIns="0" tIns="0" rIns="0" bIns="0" rtlCol="0" anchor="t">
             <a:spAutoFit/>
           </a:bodyPr>
           <a:lstStyle/>
@@ -5945,7 +6097,7 @@
               </a:lnSpc>
             </a:pPr>
             <a:r>
-              <a:rPr lang="en-US" b="true" sz="6624" spc="649">
+              <a:rPr lang="en-US" sz="6624" b="1" spc="649">
                 <a:solidFill>
                   <a:srgbClr val="FFFBFB"/>
                 </a:solidFill>
@@ -5961,12 +6113,12 @@
       </p:sp>
       <p:sp>
         <p:nvSpPr>
-          <p:cNvPr name="TextBox 11" id="11"/>
-          <p:cNvSpPr txBox="true"/>
+          <p:cNvPr id="11" name="TextBox 11"/>
+          <p:cNvSpPr txBox="1"/>
           <p:nvPr/>
         </p:nvSpPr>
         <p:spPr>
-          <a:xfrm rot="0">
+          <a:xfrm>
             <a:off x="2059451" y="5941547"/>
             <a:ext cx="3335790" cy="360660"/>
           </a:xfrm>
@@ -5975,7 +6127,7 @@
           </a:prstGeom>
         </p:spPr>
         <p:txBody>
-          <a:bodyPr anchor="t" rtlCol="false" tIns="0" lIns="0" bIns="0" rIns="0">
+          <a:bodyPr lIns="0" tIns="0" rIns="0" bIns="0" rtlCol="0" anchor="t">
             <a:spAutoFit/>
           </a:bodyPr>
           <a:lstStyle/>
@@ -5986,7 +6138,7 @@
               </a:lnSpc>
             </a:pPr>
             <a:r>
-              <a:rPr lang="en-US" b="true" sz="2139" spc="209">
+              <a:rPr lang="en-US" sz="2139" b="1" spc="209">
                 <a:solidFill>
                   <a:srgbClr val="231F20"/>
                 </a:solidFill>
@@ -6002,12 +6154,12 @@
       </p:sp>
       <p:sp>
         <p:nvSpPr>
-          <p:cNvPr name="Freeform 12" id="12"/>
+          <p:cNvPr id="12" name="Freeform 12"/>
           <p:cNvSpPr/>
           <p:nvPr/>
         </p:nvSpPr>
         <p:spPr>
-          <a:xfrm flipH="false" flipV="false" rot="0">
+          <a:xfrm>
             <a:off x="6267505" y="1920649"/>
             <a:ext cx="2027545" cy="3080525"/>
           </a:xfrm>
@@ -6016,9 +6168,9 @@
             <a:gdLst/>
             <a:ahLst/>
             <a:cxnLst/>
-            <a:rect r="r" b="b" t="t" l="l"/>
+            <a:rect l="l" t="t" r="r" b="b"/>
             <a:pathLst>
-              <a:path h="3080525" w="2027545">
+              <a:path w="2027545" h="3080525">
                 <a:moveTo>
                   <a:pt x="0" y="0"/>
                 </a:moveTo>
@@ -6047,19 +6199,26 @@
               </a:extLst>
             </a:blip>
             <a:stretch>
-              <a:fillRect l="0" t="0" r="0" b="0"/>
+              <a:fillRect/>
             </a:stretch>
           </a:blipFill>
         </p:spPr>
+        <p:txBody>
+          <a:bodyPr/>
+          <a:lstStyle/>
+          <a:p>
+            <a:endParaRPr lang="en-SE"/>
+          </a:p>
+        </p:txBody>
       </p:sp>
       <p:grpSp>
         <p:nvGrpSpPr>
-          <p:cNvPr name="Group 13" id="13"/>
+          <p:cNvPr id="13" name="Group 13"/>
           <p:cNvGrpSpPr/>
           <p:nvPr/>
         </p:nvGrpSpPr>
         <p:grpSpPr>
-          <a:xfrm rot="0">
+          <a:xfrm>
             <a:off x="7030737" y="5240576"/>
             <a:ext cx="501082" cy="501082"/>
             <a:chOff x="0" y="0"/>
@@ -6068,12 +6227,12 @@
         </p:grpSpPr>
         <p:sp>
           <p:nvSpPr>
-            <p:cNvPr name="Freeform 14" id="14"/>
+            <p:cNvPr id="14" name="Freeform 14"/>
             <p:cNvSpPr/>
             <p:nvPr/>
           </p:nvSpPr>
           <p:spPr>
-            <a:xfrm flipH="false" flipV="false" rot="0">
+            <a:xfrm>
               <a:off x="0" y="0"/>
               <a:ext cx="812800" cy="812800"/>
             </a:xfrm>
@@ -6082,9 +6241,9 @@
               <a:gdLst/>
               <a:ahLst/>
               <a:cxnLst/>
-              <a:rect r="r" b="b" t="t" l="l"/>
+              <a:rect l="l" t="t" r="r" b="b"/>
               <a:pathLst>
-                <a:path h="812800" w="812800">
+                <a:path w="812800" h="812800">
                   <a:moveTo>
                     <a:pt x="406400" y="0"/>
                   </a:moveTo>
@@ -6116,11 +6275,18 @@
               <a:srgbClr val="131211"/>
             </a:solidFill>
           </p:spPr>
+          <p:txBody>
+            <a:bodyPr/>
+            <a:lstStyle/>
+            <a:p>
+              <a:endParaRPr lang="en-SE"/>
+            </a:p>
+          </p:txBody>
         </p:sp>
         <p:sp>
           <p:nvSpPr>
-            <p:cNvPr name="TextBox 15" id="15"/>
-            <p:cNvSpPr txBox="true"/>
+            <p:cNvPr id="15" name="TextBox 15"/>
+            <p:cNvSpPr txBox="1"/>
             <p:nvPr/>
           </p:nvSpPr>
           <p:spPr>
@@ -6133,7 +6299,7 @@
             </a:prstGeom>
           </p:spPr>
           <p:txBody>
-            <a:bodyPr anchor="ctr" rtlCol="false" tIns="50800" lIns="50800" bIns="50800" rIns="50800"/>
+            <a:bodyPr lIns="50800" tIns="50800" rIns="50800" bIns="50800" rtlCol="0" anchor="ctr"/>
             <a:lstStyle/>
             <a:p>
               <a:pPr algn="ctr">
@@ -6141,18 +6307,19 @@
                   <a:spcPts val="2859"/>
                 </a:lnSpc>
               </a:pPr>
+              <a:endParaRPr/>
             </a:p>
           </p:txBody>
         </p:sp>
       </p:grpSp>
       <p:sp>
         <p:nvSpPr>
-          <p:cNvPr name="TextBox 16" id="16"/>
-          <p:cNvSpPr txBox="true"/>
+          <p:cNvPr id="16" name="TextBox 16"/>
+          <p:cNvSpPr txBox="1"/>
           <p:nvPr/>
         </p:nvSpPr>
         <p:spPr>
-          <a:xfrm rot="0">
+          <a:xfrm>
             <a:off x="6267505" y="2339199"/>
             <a:ext cx="2027545" cy="1121713"/>
           </a:xfrm>
@@ -6161,7 +6328,7 @@
           </a:prstGeom>
         </p:spPr>
         <p:txBody>
-          <a:bodyPr anchor="t" rtlCol="false" tIns="0" lIns="0" bIns="0" rIns="0">
+          <a:bodyPr lIns="0" tIns="0" rIns="0" bIns="0" rtlCol="0" anchor="t">
             <a:spAutoFit/>
           </a:bodyPr>
           <a:lstStyle/>
@@ -6172,7 +6339,7 @@
               </a:lnSpc>
             </a:pPr>
             <a:r>
-              <a:rPr lang="en-US" b="true" sz="6624" spc="649">
+              <a:rPr lang="en-US" sz="6624" b="1" spc="649">
                 <a:solidFill>
                   <a:srgbClr val="FFFBFB"/>
                 </a:solidFill>
@@ -6188,12 +6355,12 @@
       </p:sp>
       <p:sp>
         <p:nvSpPr>
-          <p:cNvPr name="Freeform 17" id="17"/>
+          <p:cNvPr id="17" name="Freeform 17"/>
           <p:cNvSpPr/>
           <p:nvPr/>
         </p:nvSpPr>
         <p:spPr>
-          <a:xfrm flipH="false" flipV="false" rot="0">
+          <a:xfrm>
             <a:off x="9758062" y="1920649"/>
             <a:ext cx="2027545" cy="3080525"/>
           </a:xfrm>
@@ -6202,9 +6369,9 @@
             <a:gdLst/>
             <a:ahLst/>
             <a:cxnLst/>
-            <a:rect r="r" b="b" t="t" l="l"/>
+            <a:rect l="l" t="t" r="r" b="b"/>
             <a:pathLst>
-              <a:path h="3080525" w="2027545">
+              <a:path w="2027545" h="3080525">
                 <a:moveTo>
                   <a:pt x="0" y="0"/>
                 </a:moveTo>
@@ -6233,19 +6400,26 @@
               </a:extLst>
             </a:blip>
             <a:stretch>
-              <a:fillRect l="0" t="0" r="0" b="0"/>
+              <a:fillRect/>
             </a:stretch>
           </a:blipFill>
         </p:spPr>
+        <p:txBody>
+          <a:bodyPr/>
+          <a:lstStyle/>
+          <a:p>
+            <a:endParaRPr lang="en-SE"/>
+          </a:p>
+        </p:txBody>
       </p:sp>
       <p:grpSp>
         <p:nvGrpSpPr>
-          <p:cNvPr name="Group 18" id="18"/>
+          <p:cNvPr id="18" name="Group 18"/>
           <p:cNvGrpSpPr/>
           <p:nvPr/>
         </p:nvGrpSpPr>
         <p:grpSpPr>
-          <a:xfrm rot="0">
+          <a:xfrm>
             <a:off x="10521294" y="5240576"/>
             <a:ext cx="501082" cy="501082"/>
             <a:chOff x="0" y="0"/>
@@ -6254,12 +6428,12 @@
         </p:grpSpPr>
         <p:sp>
           <p:nvSpPr>
-            <p:cNvPr name="Freeform 19" id="19"/>
+            <p:cNvPr id="19" name="Freeform 19"/>
             <p:cNvSpPr/>
             <p:nvPr/>
           </p:nvSpPr>
           <p:spPr>
-            <a:xfrm flipH="false" flipV="false" rot="0">
+            <a:xfrm>
               <a:off x="0" y="0"/>
               <a:ext cx="812800" cy="812800"/>
             </a:xfrm>
@@ -6268,9 +6442,9 @@
               <a:gdLst/>
               <a:ahLst/>
               <a:cxnLst/>
-              <a:rect r="r" b="b" t="t" l="l"/>
+              <a:rect l="l" t="t" r="r" b="b"/>
               <a:pathLst>
-                <a:path h="812800" w="812800">
+                <a:path w="812800" h="812800">
                   <a:moveTo>
                     <a:pt x="406400" y="0"/>
                   </a:moveTo>
@@ -6302,11 +6476,18 @@
               <a:srgbClr val="131211"/>
             </a:solidFill>
           </p:spPr>
+          <p:txBody>
+            <a:bodyPr/>
+            <a:lstStyle/>
+            <a:p>
+              <a:endParaRPr lang="en-SE"/>
+            </a:p>
+          </p:txBody>
         </p:sp>
         <p:sp>
           <p:nvSpPr>
-            <p:cNvPr name="TextBox 20" id="20"/>
-            <p:cNvSpPr txBox="true"/>
+            <p:cNvPr id="20" name="TextBox 20"/>
+            <p:cNvSpPr txBox="1"/>
             <p:nvPr/>
           </p:nvSpPr>
           <p:spPr>
@@ -6319,7 +6500,7 @@
             </a:prstGeom>
           </p:spPr>
           <p:txBody>
-            <a:bodyPr anchor="ctr" rtlCol="false" tIns="50800" lIns="50800" bIns="50800" rIns="50800"/>
+            <a:bodyPr lIns="50800" tIns="50800" rIns="50800" bIns="50800" rtlCol="0" anchor="ctr"/>
             <a:lstStyle/>
             <a:p>
               <a:pPr algn="ctr">
@@ -6327,18 +6508,19 @@
                   <a:spcPts val="2859"/>
                 </a:lnSpc>
               </a:pPr>
+              <a:endParaRPr/>
             </a:p>
           </p:txBody>
         </p:sp>
       </p:grpSp>
       <p:sp>
         <p:nvSpPr>
-          <p:cNvPr name="TextBox 21" id="21"/>
-          <p:cNvSpPr txBox="true"/>
+          <p:cNvPr id="21" name="TextBox 21"/>
+          <p:cNvSpPr txBox="1"/>
           <p:nvPr/>
         </p:nvSpPr>
         <p:spPr>
-          <a:xfrm rot="0">
+          <a:xfrm>
             <a:off x="9758062" y="2339199"/>
             <a:ext cx="2027545" cy="1121713"/>
           </a:xfrm>
@@ -6347,7 +6529,7 @@
           </a:prstGeom>
         </p:spPr>
         <p:txBody>
-          <a:bodyPr anchor="t" rtlCol="false" tIns="0" lIns="0" bIns="0" rIns="0">
+          <a:bodyPr lIns="0" tIns="0" rIns="0" bIns="0" rtlCol="0" anchor="t">
             <a:spAutoFit/>
           </a:bodyPr>
           <a:lstStyle/>
@@ -6358,7 +6540,7 @@
               </a:lnSpc>
             </a:pPr>
             <a:r>
-              <a:rPr lang="en-US" b="true" sz="6624" spc="649">
+              <a:rPr lang="en-US" sz="6624" b="1" spc="649">
                 <a:solidFill>
                   <a:srgbClr val="FFFBFB"/>
                 </a:solidFill>
@@ -6374,12 +6556,12 @@
       </p:sp>
       <p:sp>
         <p:nvSpPr>
-          <p:cNvPr name="Freeform 22" id="22"/>
+          <p:cNvPr id="22" name="Freeform 22"/>
           <p:cNvSpPr/>
           <p:nvPr/>
         </p:nvSpPr>
         <p:spPr>
-          <a:xfrm flipH="false" flipV="false" rot="0">
+          <a:xfrm>
             <a:off x="13248619" y="1920649"/>
             <a:ext cx="2027545" cy="3080525"/>
           </a:xfrm>
@@ -6388,9 +6570,9 @@
             <a:gdLst/>
             <a:ahLst/>
             <a:cxnLst/>
-            <a:rect r="r" b="b" t="t" l="l"/>
+            <a:rect l="l" t="t" r="r" b="b"/>
             <a:pathLst>
-              <a:path h="3080525" w="2027545">
+              <a:path w="2027545" h="3080525">
                 <a:moveTo>
                   <a:pt x="0" y="0"/>
                 </a:moveTo>
@@ -6419,19 +6601,26 @@
               </a:extLst>
             </a:blip>
             <a:stretch>
-              <a:fillRect l="0" t="0" r="0" b="0"/>
+              <a:fillRect/>
             </a:stretch>
           </a:blipFill>
         </p:spPr>
+        <p:txBody>
+          <a:bodyPr/>
+          <a:lstStyle/>
+          <a:p>
+            <a:endParaRPr lang="en-SE"/>
+          </a:p>
+        </p:txBody>
       </p:sp>
       <p:grpSp>
         <p:nvGrpSpPr>
-          <p:cNvPr name="Group 23" id="23"/>
+          <p:cNvPr id="23" name="Group 23"/>
           <p:cNvGrpSpPr/>
           <p:nvPr/>
         </p:nvGrpSpPr>
         <p:grpSpPr>
-          <a:xfrm rot="0">
+          <a:xfrm>
             <a:off x="14011851" y="5240576"/>
             <a:ext cx="501082" cy="501082"/>
             <a:chOff x="0" y="0"/>
@@ -6440,12 +6629,12 @@
         </p:grpSpPr>
         <p:sp>
           <p:nvSpPr>
-            <p:cNvPr name="Freeform 24" id="24"/>
+            <p:cNvPr id="24" name="Freeform 24"/>
             <p:cNvSpPr/>
             <p:nvPr/>
           </p:nvSpPr>
           <p:spPr>
-            <a:xfrm flipH="false" flipV="false" rot="0">
+            <a:xfrm>
               <a:off x="0" y="0"/>
               <a:ext cx="812800" cy="812800"/>
             </a:xfrm>
@@ -6454,9 +6643,9 @@
               <a:gdLst/>
               <a:ahLst/>
               <a:cxnLst/>
-              <a:rect r="r" b="b" t="t" l="l"/>
+              <a:rect l="l" t="t" r="r" b="b"/>
               <a:pathLst>
-                <a:path h="812800" w="812800">
+                <a:path w="812800" h="812800">
                   <a:moveTo>
                     <a:pt x="406400" y="0"/>
                   </a:moveTo>
@@ -6488,11 +6677,18 @@
               <a:srgbClr val="131211"/>
             </a:solidFill>
           </p:spPr>
+          <p:txBody>
+            <a:bodyPr/>
+            <a:lstStyle/>
+            <a:p>
+              <a:endParaRPr lang="en-SE"/>
+            </a:p>
+          </p:txBody>
         </p:sp>
         <p:sp>
           <p:nvSpPr>
-            <p:cNvPr name="TextBox 25" id="25"/>
-            <p:cNvSpPr txBox="true"/>
+            <p:cNvPr id="25" name="TextBox 25"/>
+            <p:cNvSpPr txBox="1"/>
             <p:nvPr/>
           </p:nvSpPr>
           <p:spPr>
@@ -6505,7 +6701,7 @@
             </a:prstGeom>
           </p:spPr>
           <p:txBody>
-            <a:bodyPr anchor="ctr" rtlCol="false" tIns="50800" lIns="50800" bIns="50800" rIns="50800"/>
+            <a:bodyPr lIns="50800" tIns="50800" rIns="50800" bIns="50800" rtlCol="0" anchor="ctr"/>
             <a:lstStyle/>
             <a:p>
               <a:pPr algn="ctr">
@@ -6513,18 +6709,19 @@
                   <a:spcPts val="2859"/>
                 </a:lnSpc>
               </a:pPr>
+              <a:endParaRPr/>
             </a:p>
           </p:txBody>
         </p:sp>
       </p:grpSp>
       <p:sp>
         <p:nvSpPr>
-          <p:cNvPr name="TextBox 26" id="26"/>
-          <p:cNvSpPr txBox="true"/>
+          <p:cNvPr id="26" name="TextBox 26"/>
+          <p:cNvSpPr txBox="1"/>
           <p:nvPr/>
         </p:nvSpPr>
         <p:spPr>
-          <a:xfrm rot="0">
+          <a:xfrm>
             <a:off x="13248619" y="2339199"/>
             <a:ext cx="2027545" cy="1121713"/>
           </a:xfrm>
@@ -6533,7 +6730,7 @@
           </a:prstGeom>
         </p:spPr>
         <p:txBody>
-          <a:bodyPr anchor="t" rtlCol="false" tIns="0" lIns="0" bIns="0" rIns="0">
+          <a:bodyPr lIns="0" tIns="0" rIns="0" bIns="0" rtlCol="0" anchor="t">
             <a:spAutoFit/>
           </a:bodyPr>
           <a:lstStyle/>
@@ -6544,7 +6741,7 @@
               </a:lnSpc>
             </a:pPr>
             <a:r>
-              <a:rPr lang="en-US" b="true" sz="6624" spc="649">
+              <a:rPr lang="en-US" sz="6624" b="1" spc="649">
                 <a:solidFill>
                   <a:srgbClr val="FFFBFB"/>
                 </a:solidFill>
@@ -6560,12 +6757,12 @@
       </p:sp>
       <p:sp>
         <p:nvSpPr>
-          <p:cNvPr name="TextBox 27" id="27"/>
-          <p:cNvSpPr txBox="true"/>
+          <p:cNvPr id="27" name="TextBox 27"/>
+          <p:cNvSpPr txBox="1"/>
           <p:nvPr/>
         </p:nvSpPr>
         <p:spPr>
-          <a:xfrm rot="0">
+          <a:xfrm>
             <a:off x="5679015" y="6794571"/>
             <a:ext cx="3204526" cy="2859235"/>
           </a:xfrm>
@@ -6574,7 +6771,7 @@
           </a:prstGeom>
         </p:spPr>
         <p:txBody>
-          <a:bodyPr anchor="t" rtlCol="false" tIns="0" lIns="0" bIns="0" rIns="0">
+          <a:bodyPr lIns="0" tIns="0" rIns="0" bIns="0" rtlCol="0" anchor="t">
             <a:spAutoFit/>
           </a:bodyPr>
           <a:lstStyle/>
@@ -6601,12 +6798,12 @@
       </p:sp>
       <p:sp>
         <p:nvSpPr>
-          <p:cNvPr name="TextBox 28" id="28"/>
-          <p:cNvSpPr txBox="true"/>
+          <p:cNvPr id="28" name="TextBox 28"/>
+          <p:cNvSpPr txBox="1"/>
           <p:nvPr/>
         </p:nvSpPr>
         <p:spPr>
-          <a:xfrm rot="0">
+          <a:xfrm>
             <a:off x="5889722" y="5960597"/>
             <a:ext cx="2993819" cy="641188"/>
           </a:xfrm>
@@ -6615,7 +6812,7 @@
           </a:prstGeom>
         </p:spPr>
         <p:txBody>
-          <a:bodyPr anchor="t" rtlCol="false" tIns="0" lIns="0" bIns="0" rIns="0">
+          <a:bodyPr lIns="0" tIns="0" rIns="0" bIns="0" rtlCol="0" anchor="t">
             <a:spAutoFit/>
           </a:bodyPr>
           <a:lstStyle/>
@@ -6626,7 +6823,7 @@
               </a:lnSpc>
             </a:pPr>
             <a:r>
-              <a:rPr lang="en-US" b="true" sz="1951" spc="191">
+              <a:rPr lang="en-US" sz="1951" b="1" spc="191">
                 <a:solidFill>
                   <a:srgbClr val="231F20"/>
                 </a:solidFill>
@@ -6642,12 +6839,12 @@
       </p:sp>
       <p:sp>
         <p:nvSpPr>
-          <p:cNvPr name="TextBox 29" id="29"/>
-          <p:cNvSpPr txBox="true"/>
+          <p:cNvPr id="29" name="TextBox 29"/>
+          <p:cNvSpPr txBox="1"/>
           <p:nvPr/>
         </p:nvSpPr>
         <p:spPr>
-          <a:xfrm rot="0">
+          <a:xfrm>
             <a:off x="9169572" y="7037470"/>
             <a:ext cx="3204526" cy="3497640"/>
           </a:xfrm>
@@ -6656,7 +6853,7 @@
           </a:prstGeom>
         </p:spPr>
         <p:txBody>
-          <a:bodyPr anchor="t" rtlCol="false" tIns="0" lIns="0" bIns="0" rIns="0">
+          <a:bodyPr lIns="0" tIns="0" rIns="0" bIns="0" rtlCol="0" anchor="t">
             <a:spAutoFit/>
           </a:bodyPr>
           <a:lstStyle/>
@@ -6685,6 +6882,15 @@
                 <a:spcPts val="2545"/>
               </a:lnSpc>
             </a:pPr>
+            <a:endParaRPr lang="en-US" sz="1844" spc="180">
+              <a:solidFill>
+                <a:srgbClr val="231F20"/>
+              </a:solidFill>
+              <a:latin typeface="DM Sans"/>
+              <a:ea typeface="DM Sans"/>
+              <a:cs typeface="DM Sans"/>
+              <a:sym typeface="DM Sans"/>
+            </a:endParaRPr>
           </a:p>
           <a:p>
             <a:pPr algn="ctr">
@@ -6692,17 +6898,26 @@
                 <a:spcPts val="2545"/>
               </a:lnSpc>
             </a:pPr>
-          </a:p>
-        </p:txBody>
-      </p:sp>
-      <p:sp>
-        <p:nvSpPr>
-          <p:cNvPr name="TextBox 30" id="30"/>
-          <p:cNvSpPr txBox="true"/>
+            <a:endParaRPr lang="en-US" sz="1844" spc="180">
+              <a:solidFill>
+                <a:srgbClr val="231F20"/>
+              </a:solidFill>
+              <a:latin typeface="DM Sans"/>
+              <a:ea typeface="DM Sans"/>
+              <a:cs typeface="DM Sans"/>
+              <a:sym typeface="DM Sans"/>
+            </a:endParaRPr>
+          </a:p>
+        </p:txBody>
+      </p:sp>
+      <p:sp>
+        <p:nvSpPr>
+          <p:cNvPr id="30" name="TextBox 30"/>
+          <p:cNvSpPr txBox="1"/>
           <p:nvPr/>
         </p:nvSpPr>
         <p:spPr>
-          <a:xfrm rot="0">
+          <a:xfrm>
             <a:off x="9380279" y="5960597"/>
             <a:ext cx="2709833" cy="974563"/>
           </a:xfrm>
@@ -6711,7 +6926,7 @@
           </a:prstGeom>
         </p:spPr>
         <p:txBody>
-          <a:bodyPr anchor="t" rtlCol="false" tIns="0" lIns="0" bIns="0" rIns="0">
+          <a:bodyPr lIns="0" tIns="0" rIns="0" bIns="0" rtlCol="0" anchor="t">
             <a:spAutoFit/>
           </a:bodyPr>
           <a:lstStyle/>
@@ -6722,7 +6937,7 @@
               </a:lnSpc>
             </a:pPr>
             <a:r>
-              <a:rPr lang="en-US" b="true" sz="1951" spc="191">
+              <a:rPr lang="en-US" sz="1951" b="1" spc="191">
                 <a:solidFill>
                   <a:srgbClr val="231F20"/>
                 </a:solidFill>
@@ -6738,12 +6953,12 @@
       </p:sp>
       <p:sp>
         <p:nvSpPr>
-          <p:cNvPr name="TextBox 31" id="31"/>
-          <p:cNvSpPr txBox="true"/>
+          <p:cNvPr id="31" name="TextBox 31"/>
+          <p:cNvSpPr txBox="1"/>
           <p:nvPr/>
         </p:nvSpPr>
         <p:spPr>
-          <a:xfrm rot="0">
+          <a:xfrm>
             <a:off x="12660129" y="6538853"/>
             <a:ext cx="3204526" cy="1582425"/>
           </a:xfrm>
@@ -6752,7 +6967,7 @@
           </a:prstGeom>
         </p:spPr>
         <p:txBody>
-          <a:bodyPr anchor="t" rtlCol="false" tIns="0" lIns="0" bIns="0" rIns="0">
+          <a:bodyPr lIns="0" tIns="0" rIns="0" bIns="0" rtlCol="0" anchor="t">
             <a:spAutoFit/>
           </a:bodyPr>
           <a:lstStyle/>
@@ -6779,12 +6994,12 @@
       </p:sp>
       <p:sp>
         <p:nvSpPr>
-          <p:cNvPr name="TextBox 32" id="32"/>
-          <p:cNvSpPr txBox="true"/>
+          <p:cNvPr id="32" name="TextBox 32"/>
+          <p:cNvSpPr txBox="1"/>
           <p:nvPr/>
         </p:nvSpPr>
         <p:spPr>
-          <a:xfrm rot="0">
+          <a:xfrm>
             <a:off x="12870836" y="5942960"/>
             <a:ext cx="2709833" cy="410683"/>
           </a:xfrm>
@@ -6793,7 +7008,7 @@
           </a:prstGeom>
         </p:spPr>
         <p:txBody>
-          <a:bodyPr anchor="t" rtlCol="false" tIns="0" lIns="0" bIns="0" rIns="0">
+          <a:bodyPr lIns="0" tIns="0" rIns="0" bIns="0" rtlCol="0" anchor="t">
             <a:spAutoFit/>
           </a:bodyPr>
           <a:lstStyle/>
@@ -6804,7 +7019,7 @@
               </a:lnSpc>
             </a:pPr>
             <a:r>
-              <a:rPr lang="en-US" b="true" sz="2451" spc="240">
+              <a:rPr lang="en-US" sz="2451" b="1" spc="240">
                 <a:solidFill>
                   <a:srgbClr val="231F20"/>
                 </a:solidFill>
@@ -6820,12 +7035,12 @@
       </p:sp>
       <p:sp>
         <p:nvSpPr>
-          <p:cNvPr name="Freeform 33" id="33"/>
+          <p:cNvPr id="33" name="Freeform 33"/>
           <p:cNvSpPr/>
           <p:nvPr/>
         </p:nvSpPr>
         <p:spPr>
-          <a:xfrm flipH="false" flipV="false" rot="-10799999">
+          <a:xfrm rot="-10799999">
             <a:off x="-2729621" y="-7074240"/>
             <a:ext cx="7835077" cy="10939025"/>
           </a:xfrm>
@@ -6834,9 +7049,9 @@
             <a:gdLst/>
             <a:ahLst/>
             <a:cxnLst/>
-            <a:rect r="r" b="b" t="t" l="l"/>
+            <a:rect l="l" t="t" r="r" b="b"/>
             <a:pathLst>
-              <a:path h="10939025" w="7835077">
+              <a:path w="7835077" h="10939025">
                 <a:moveTo>
                   <a:pt x="0" y="0"/>
                 </a:moveTo>
@@ -6865,19 +7080,26 @@
               </a:extLst>
             </a:blip>
             <a:stretch>
-              <a:fillRect l="0" t="0" r="0" b="0"/>
+              <a:fillRect/>
             </a:stretch>
           </a:blipFill>
         </p:spPr>
-      </p:sp>
-      <p:sp>
-        <p:nvSpPr>
-          <p:cNvPr name="TextBox 34" id="34"/>
-          <p:cNvSpPr txBox="true"/>
+        <p:txBody>
+          <a:bodyPr/>
+          <a:lstStyle/>
+          <a:p>
+            <a:endParaRPr lang="en-SE"/>
+          </a:p>
+        </p:txBody>
+      </p:sp>
+      <p:sp>
+        <p:nvSpPr>
+          <p:cNvPr id="34" name="TextBox 34"/>
+          <p:cNvSpPr txBox="1"/>
           <p:nvPr/>
         </p:nvSpPr>
         <p:spPr>
-          <a:xfrm rot="0">
+          <a:xfrm>
             <a:off x="2190716" y="263649"/>
             <a:ext cx="9332639" cy="1267228"/>
           </a:xfrm>
@@ -6886,7 +7108,7 @@
           </a:prstGeom>
         </p:spPr>
         <p:txBody>
-          <a:bodyPr anchor="t" rtlCol="false" tIns="0" lIns="0" bIns="0" rIns="0">
+          <a:bodyPr lIns="0" tIns="0" rIns="0" bIns="0" rtlCol="0" anchor="t">
             <a:spAutoFit/>
           </a:bodyPr>
           <a:lstStyle/>
@@ -6897,7 +7119,7 @@
               </a:lnSpc>
             </a:pPr>
             <a:r>
-              <a:rPr lang="en-US" b="true" sz="7482" spc="733">
+              <a:rPr lang="en-US" sz="7482" b="1" spc="733">
                 <a:solidFill>
                   <a:srgbClr val="231F20"/>
                 </a:solidFill>
@@ -6920,13 +7142,14 @@
 </file>
 
 <file path=ppt/slides/slide5.xml><?xml version="1.0" encoding="utf-8"?>
-<p:sld xmlns:p="http://schemas.openxmlformats.org/presentationml/2006/main" xmlns:a="http://schemas.openxmlformats.org/drawingml/2006/main" xmlns:r="http://schemas.openxmlformats.org/officeDocument/2006/relationships">
+<p:sld xmlns:a="http://schemas.openxmlformats.org/drawingml/2006/main" xmlns:r="http://schemas.openxmlformats.org/officeDocument/2006/relationships" xmlns:p="http://schemas.openxmlformats.org/presentationml/2006/main">
   <p:cSld>
     <p:bg>
       <p:bgPr>
         <a:solidFill>
           <a:srgbClr val="1A1A1A"/>
         </a:solidFill>
+        <a:effectLst/>
       </p:bgPr>
     </p:bg>
     <p:spTree>
@@ -6945,12 +7168,12 @@
       </p:grpSpPr>
       <p:sp>
         <p:nvSpPr>
-          <p:cNvPr name="Freeform 2" id="2"/>
+          <p:cNvPr id="2" name="Freeform 2"/>
           <p:cNvSpPr/>
           <p:nvPr/>
         </p:nvSpPr>
         <p:spPr>
-          <a:xfrm flipH="false" flipV="false" rot="0">
+          <a:xfrm>
             <a:off x="-8169367" y="-10264537"/>
             <a:ext cx="15841853" cy="16255633"/>
           </a:xfrm>
@@ -6959,9 +7182,9 @@
             <a:gdLst/>
             <a:ahLst/>
             <a:cxnLst/>
-            <a:rect r="r" b="b" t="t" l="l"/>
+            <a:rect l="l" t="t" r="r" b="b"/>
             <a:pathLst>
-              <a:path h="16255633" w="15841853">
+              <a:path w="15841853" h="16255633">
                 <a:moveTo>
                   <a:pt x="0" y="0"/>
                 </a:moveTo>
@@ -6990,19 +7213,26 @@
               </a:extLst>
             </a:blip>
             <a:stretch>
-              <a:fillRect l="0" t="0" r="0" b="0"/>
+              <a:fillRect/>
             </a:stretch>
           </a:blipFill>
         </p:spPr>
-      </p:sp>
-      <p:sp>
-        <p:nvSpPr>
-          <p:cNvPr name="Freeform 3" id="3"/>
+        <p:txBody>
+          <a:bodyPr/>
+          <a:lstStyle/>
+          <a:p>
+            <a:endParaRPr lang="en-SE"/>
+          </a:p>
+        </p:txBody>
+      </p:sp>
+      <p:sp>
+        <p:nvSpPr>
+          <p:cNvPr id="3" name="Freeform 3"/>
           <p:cNvSpPr/>
           <p:nvPr/>
         </p:nvSpPr>
         <p:spPr>
-          <a:xfrm flipH="false" flipV="false" rot="0">
+          <a:xfrm>
             <a:off x="13447294" y="-3843198"/>
             <a:ext cx="15841853" cy="16255633"/>
           </a:xfrm>
@@ -7011,9 +7241,9 @@
             <a:gdLst/>
             <a:ahLst/>
             <a:cxnLst/>
-            <a:rect r="r" b="b" t="t" l="l"/>
+            <a:rect l="l" t="t" r="r" b="b"/>
             <a:pathLst>
-              <a:path h="16255633" w="15841853">
+              <a:path w="15841853" h="16255633">
                 <a:moveTo>
                   <a:pt x="0" y="0"/>
                 </a:moveTo>
@@ -7042,19 +7272,26 @@
               </a:extLst>
             </a:blip>
             <a:stretch>
-              <a:fillRect l="0" t="0" r="0" b="0"/>
+              <a:fillRect/>
             </a:stretch>
           </a:blipFill>
         </p:spPr>
-      </p:sp>
-      <p:sp>
-        <p:nvSpPr>
-          <p:cNvPr name="TextBox 4" id="4"/>
-          <p:cNvSpPr txBox="true"/>
+        <p:txBody>
+          <a:bodyPr/>
+          <a:lstStyle/>
+          <a:p>
+            <a:endParaRPr lang="en-SE"/>
+          </a:p>
+        </p:txBody>
+      </p:sp>
+      <p:sp>
+        <p:nvSpPr>
+          <p:cNvPr id="4" name="TextBox 4"/>
+          <p:cNvSpPr txBox="1"/>
           <p:nvPr/>
         </p:nvSpPr>
         <p:spPr>
-          <a:xfrm rot="0">
+          <a:xfrm>
             <a:off x="2720102" y="4791547"/>
             <a:ext cx="10951206" cy="1602163"/>
           </a:xfrm>
@@ -7063,7 +7300,7 @@
           </a:prstGeom>
         </p:spPr>
         <p:txBody>
-          <a:bodyPr anchor="t" rtlCol="false" tIns="0" lIns="0" bIns="0" rIns="0">
+          <a:bodyPr lIns="0" tIns="0" rIns="0" bIns="0" rtlCol="0" anchor="t">
             <a:spAutoFit/>
           </a:bodyPr>
           <a:lstStyle/>
@@ -7097,13 +7334,14 @@
 </file>
 
 <file path=ppt/slides/slide6.xml><?xml version="1.0" encoding="utf-8"?>
-<p:sld xmlns:p="http://schemas.openxmlformats.org/presentationml/2006/main" xmlns:a="http://schemas.openxmlformats.org/drawingml/2006/main" xmlns:r="http://schemas.openxmlformats.org/officeDocument/2006/relationships">
+<p:sld xmlns:a="http://schemas.openxmlformats.org/drawingml/2006/main" xmlns:r="http://schemas.openxmlformats.org/officeDocument/2006/relationships" xmlns:p="http://schemas.openxmlformats.org/presentationml/2006/main">
   <p:cSld>
     <p:bg>
       <p:bgPr>
         <a:solidFill>
           <a:srgbClr val="1A1A1A"/>
         </a:solidFill>
+        <a:effectLst/>
       </p:bgPr>
     </p:bg>
     <p:spTree>
@@ -7122,12 +7360,12 @@
       </p:grpSpPr>
       <p:sp>
         <p:nvSpPr>
-          <p:cNvPr name="Freeform 2" id="2"/>
+          <p:cNvPr id="2" name="Freeform 2"/>
           <p:cNvSpPr/>
           <p:nvPr/>
         </p:nvSpPr>
         <p:spPr>
-          <a:xfrm flipH="false" flipV="false" rot="0">
+          <a:xfrm>
             <a:off x="239790" y="1869843"/>
             <a:ext cx="10318835" cy="1232285"/>
           </a:xfrm>
@@ -7136,9 +7374,9 @@
             <a:gdLst/>
             <a:ahLst/>
             <a:cxnLst/>
-            <a:rect r="r" b="b" t="t" l="l"/>
+            <a:rect l="l" t="t" r="r" b="b"/>
             <a:pathLst>
-              <a:path h="1232285" w="10318835">
+              <a:path w="10318835" h="1232285">
                 <a:moveTo>
                   <a:pt x="0" y="0"/>
                 </a:moveTo>
@@ -7161,19 +7399,26 @@
           <a:blipFill>
             <a:blip r:embed="rId3"/>
             <a:stretch>
-              <a:fillRect l="0" t="0" r="0" b="0"/>
+              <a:fillRect/>
             </a:stretch>
           </a:blipFill>
         </p:spPr>
-      </p:sp>
-      <p:sp>
-        <p:nvSpPr>
-          <p:cNvPr name="Freeform 3" id="3"/>
+        <p:txBody>
+          <a:bodyPr/>
+          <a:lstStyle/>
+          <a:p>
+            <a:endParaRPr lang="en-SE"/>
+          </a:p>
+        </p:txBody>
+      </p:sp>
+      <p:sp>
+        <p:nvSpPr>
+          <p:cNvPr id="3" name="Freeform 3"/>
           <p:cNvSpPr/>
           <p:nvPr/>
         </p:nvSpPr>
         <p:spPr>
-          <a:xfrm flipH="false" flipV="false" rot="0">
+          <a:xfrm>
             <a:off x="239790" y="4203928"/>
             <a:ext cx="13345206" cy="5052916"/>
           </a:xfrm>
@@ -7182,9 +7427,9 @@
             <a:gdLst/>
             <a:ahLst/>
             <a:cxnLst/>
-            <a:rect r="r" b="b" t="t" l="l"/>
+            <a:rect l="l" t="t" r="r" b="b"/>
             <a:pathLst>
-              <a:path h="5052916" w="13345206">
+              <a:path w="13345206" h="5052916">
                 <a:moveTo>
                   <a:pt x="0" y="0"/>
                 </a:moveTo>
@@ -7207,28 +7452,35 @@
           <a:blipFill>
             <a:blip r:embed="rId4"/>
             <a:stretch>
-              <a:fillRect l="-5529" t="0" r="-7091" b="0"/>
+              <a:fillRect l="-5529" r="-7091"/>
             </a:stretch>
           </a:blipFill>
         </p:spPr>
-      </p:sp>
-      <p:sp>
-        <p:nvSpPr>
-          <p:cNvPr name="TextBox 4" id="4"/>
-          <p:cNvSpPr txBox="true"/>
+        <p:txBody>
+          <a:bodyPr/>
+          <a:lstStyle/>
+          <a:p>
+            <a:endParaRPr lang="en-SE"/>
+          </a:p>
+        </p:txBody>
+      </p:sp>
+      <p:sp>
+        <p:nvSpPr>
+          <p:cNvPr id="4" name="TextBox 4"/>
+          <p:cNvSpPr txBox="1"/>
           <p:nvPr/>
         </p:nvSpPr>
         <p:spPr>
-          <a:xfrm rot="0">
+          <a:xfrm>
             <a:off x="437126" y="490226"/>
-            <a:ext cx="1795165" cy="962647"/>
+            <a:ext cx="2382274" cy="962647"/>
           </a:xfrm>
           <a:prstGeom prst="rect">
             <a:avLst/>
           </a:prstGeom>
         </p:spPr>
         <p:txBody>
-          <a:bodyPr anchor="t" rtlCol="false" tIns="0" lIns="0" bIns="0" rIns="0">
+          <a:bodyPr wrap="square" lIns="0" tIns="0" rIns="0" bIns="0" rtlCol="0" anchor="t">
             <a:spAutoFit/>
           </a:bodyPr>
           <a:lstStyle/>
@@ -7239,7 +7491,7 @@
               </a:lnSpc>
             </a:pPr>
             <a:r>
-              <a:rPr lang="en-US" sz="5600" b="true">
+              <a:rPr lang="en-US" sz="5600" b="1" dirty="0">
                 <a:solidFill>
                   <a:srgbClr val="FFFFFF"/>
                 </a:solidFill>
@@ -7255,12 +7507,12 @@
       </p:sp>
       <p:sp>
         <p:nvSpPr>
-          <p:cNvPr name="TextBox 5" id="5"/>
-          <p:cNvSpPr txBox="true"/>
+          <p:cNvPr id="5" name="TextBox 5"/>
+          <p:cNvSpPr txBox="1"/>
           <p:nvPr/>
         </p:nvSpPr>
         <p:spPr>
-          <a:xfrm rot="0">
+          <a:xfrm>
             <a:off x="11159119" y="748994"/>
             <a:ext cx="6850660" cy="3454934"/>
           </a:xfrm>
@@ -7269,7 +7521,7 @@
           </a:prstGeom>
         </p:spPr>
         <p:txBody>
-          <a:bodyPr anchor="t" rtlCol="false" tIns="0" lIns="0" bIns="0" rIns="0">
+          <a:bodyPr lIns="0" tIns="0" rIns="0" bIns="0" rtlCol="0" anchor="t">
             <a:spAutoFit/>
           </a:bodyPr>
           <a:lstStyle/>
@@ -7279,9 +7531,10 @@
                 <a:spcPts val="3322"/>
               </a:lnSpc>
             </a:pPr>
-          </a:p>
-          <a:p>
-            <a:pPr algn="l" marL="509482" indent="-254741" lvl="1">
+            <a:endParaRPr/>
+          </a:p>
+          <a:p>
+            <a:pPr marL="509482" lvl="1" indent="-254741" algn="l">
               <a:lnSpc>
                 <a:spcPts val="3067"/>
               </a:lnSpc>
@@ -7301,23 +7554,11 @@
                 <a:cs typeface="Open Sauce"/>
                 <a:sym typeface="Open Sauce"/>
               </a:rPr>
-              <a:t>Highest Sales: May with $53,150, suggesting a s</a:t>
-            </a:r>
-            <a:r>
-              <a:rPr lang="en-US" sz="2359">
-                <a:solidFill>
-                  <a:srgbClr val="FFFFFF"/>
-                </a:solidFill>
-                <a:latin typeface="Open Sauce"/>
-                <a:ea typeface="Open Sauce"/>
-                <a:cs typeface="Open Sauce"/>
-                <a:sym typeface="Open Sauce"/>
-              </a:rPr>
-              <a:t>uccessful sales period.</a:t>
-            </a:r>
-          </a:p>
-          <a:p>
-            <a:pPr algn="l" marL="509482" indent="-254741" lvl="1">
+              <a:t>Highest Sales: May with $53,150, suggesting a successful sales period.</a:t>
+            </a:r>
+          </a:p>
+          <a:p>
+            <a:pPr marL="509482" lvl="1" indent="-254741" algn="l">
               <a:lnSpc>
                 <a:spcPts val="3067"/>
               </a:lnSpc>
@@ -7341,7 +7582,7 @@
             </a:r>
           </a:p>
           <a:p>
-            <a:pPr algn="l" marL="509482" indent="-254741" lvl="1">
+            <a:pPr marL="509482" lvl="1" indent="-254741" algn="l">
               <a:lnSpc>
                 <a:spcPts val="3067"/>
               </a:lnSpc>
@@ -7365,7 +7606,7 @@
             </a:r>
           </a:p>
           <a:p>
-            <a:pPr algn="l" marL="509482" indent="-254741" lvl="1">
+            <a:pPr marL="509482" lvl="1" indent="-254741" algn="l">
               <a:lnSpc>
                 <a:spcPts val="3067"/>
               </a:lnSpc>
@@ -7397,17 +7638,26 @@
                 <a:spcPct val="0"/>
               </a:spcBef>
             </a:pPr>
-          </a:p>
-        </p:txBody>
-      </p:sp>
-      <p:sp>
-        <p:nvSpPr>
-          <p:cNvPr name="Freeform 6" id="6"/>
+            <a:endParaRPr lang="en-US" sz="2359">
+              <a:solidFill>
+                <a:srgbClr val="FFFFFF"/>
+              </a:solidFill>
+              <a:latin typeface="Open Sauce"/>
+              <a:ea typeface="Open Sauce"/>
+              <a:cs typeface="Open Sauce"/>
+              <a:sym typeface="Open Sauce"/>
+            </a:endParaRPr>
+          </a:p>
+        </p:txBody>
+      </p:sp>
+      <p:sp>
+        <p:nvSpPr>
+          <p:cNvPr id="6" name="Freeform 6"/>
           <p:cNvSpPr/>
           <p:nvPr/>
         </p:nvSpPr>
         <p:spPr>
-          <a:xfrm flipH="false" flipV="false" rot="0">
+          <a:xfrm>
             <a:off x="13100801" y="6035855"/>
             <a:ext cx="15841853" cy="16255633"/>
           </a:xfrm>
@@ -7416,9 +7666,9 @@
             <a:gdLst/>
             <a:ahLst/>
             <a:cxnLst/>
-            <a:rect r="r" b="b" t="t" l="l"/>
+            <a:rect l="l" t="t" r="r" b="b"/>
             <a:pathLst>
-              <a:path h="16255633" w="15841853">
+              <a:path w="15841853" h="16255633">
                 <a:moveTo>
                   <a:pt x="0" y="0"/>
                 </a:moveTo>
@@ -7447,10 +7697,17 @@
               </a:extLst>
             </a:blip>
             <a:stretch>
-              <a:fillRect l="0" t="0" r="0" b="0"/>
+              <a:fillRect/>
             </a:stretch>
           </a:blipFill>
         </p:spPr>
+        <p:txBody>
+          <a:bodyPr/>
+          <a:lstStyle/>
+          <a:p>
+            <a:endParaRPr lang="en-SE"/>
+          </a:p>
+        </p:txBody>
       </p:sp>
     </p:spTree>
   </p:cSld>
@@ -7461,13 +7718,14 @@
 </file>
 
 <file path=ppt/slides/slide7.xml><?xml version="1.0" encoding="utf-8"?>
-<p:sld xmlns:p="http://schemas.openxmlformats.org/presentationml/2006/main" xmlns:a="http://schemas.openxmlformats.org/drawingml/2006/main" xmlns:r="http://schemas.openxmlformats.org/officeDocument/2006/relationships">
+<p:sld xmlns:a="http://schemas.openxmlformats.org/drawingml/2006/main" xmlns:r="http://schemas.openxmlformats.org/officeDocument/2006/relationships" xmlns:p="http://schemas.openxmlformats.org/presentationml/2006/main">
   <p:cSld>
     <p:bg>
       <p:bgPr>
         <a:solidFill>
           <a:srgbClr val="1A1A1A"/>
         </a:solidFill>
+        <a:effectLst/>
       </p:bgPr>
     </p:bg>
     <p:spTree>
@@ -7486,12 +7744,12 @@
       </p:grpSpPr>
       <p:sp>
         <p:nvSpPr>
-          <p:cNvPr name="Freeform 2" id="2"/>
+          <p:cNvPr id="2" name="Freeform 2"/>
           <p:cNvSpPr/>
           <p:nvPr/>
         </p:nvSpPr>
         <p:spPr>
-          <a:xfrm flipH="false" flipV="false" rot="0">
+          <a:xfrm>
             <a:off x="513486" y="1060255"/>
             <a:ext cx="11440652" cy="8198045"/>
           </a:xfrm>
@@ -7500,9 +7758,9 @@
             <a:gdLst/>
             <a:ahLst/>
             <a:cxnLst/>
-            <a:rect r="r" b="b" t="t" l="l"/>
+            <a:rect l="l" t="t" r="r" b="b"/>
             <a:pathLst>
-              <a:path h="8198045" w="11440652">
+              <a:path w="11440652" h="8198045">
                 <a:moveTo>
                   <a:pt x="0" y="0"/>
                 </a:moveTo>
@@ -7525,19 +7783,26 @@
           <a:blipFill>
             <a:blip r:embed="rId3"/>
             <a:stretch>
-              <a:fillRect l="0" t="0" r="0" b="0"/>
+              <a:fillRect/>
             </a:stretch>
           </a:blipFill>
         </p:spPr>
-      </p:sp>
-      <p:sp>
-        <p:nvSpPr>
-          <p:cNvPr name="TextBox 3" id="3"/>
-          <p:cNvSpPr txBox="true"/>
+        <p:txBody>
+          <a:bodyPr/>
+          <a:lstStyle/>
+          <a:p>
+            <a:endParaRPr lang="en-SE"/>
+          </a:p>
+        </p:txBody>
+      </p:sp>
+      <p:sp>
+        <p:nvSpPr>
+          <p:cNvPr id="3" name="TextBox 3"/>
+          <p:cNvSpPr txBox="1"/>
           <p:nvPr/>
         </p:nvSpPr>
         <p:spPr>
-          <a:xfrm rot="0">
+          <a:xfrm>
             <a:off x="12966303" y="981075"/>
             <a:ext cx="4614267" cy="495301"/>
           </a:xfrm>
@@ -7546,7 +7811,7 @@
           </a:prstGeom>
         </p:spPr>
         <p:txBody>
-          <a:bodyPr anchor="t" rtlCol="false" tIns="0" lIns="0" bIns="0" rIns="0">
+          <a:bodyPr lIns="0" tIns="0" rIns="0" bIns="0" rtlCol="0" anchor="t">
             <a:spAutoFit/>
           </a:bodyPr>
           <a:lstStyle/>
@@ -7557,7 +7822,7 @@
               </a:lnSpc>
             </a:pPr>
             <a:r>
-              <a:rPr lang="en-US" sz="2999" b="true">
+              <a:rPr lang="en-US" sz="2999" b="1">
                 <a:solidFill>
                   <a:srgbClr val="FFFFFF"/>
                 </a:solidFill>
@@ -7573,12 +7838,12 @@
       </p:sp>
       <p:sp>
         <p:nvSpPr>
-          <p:cNvPr name="TextBox 4" id="4"/>
-          <p:cNvSpPr txBox="true"/>
+          <p:cNvPr id="4" name="TextBox 4"/>
+          <p:cNvSpPr txBox="1"/>
           <p:nvPr/>
         </p:nvSpPr>
         <p:spPr>
-          <a:xfrm rot="0">
+          <a:xfrm>
             <a:off x="12210881" y="2202291"/>
             <a:ext cx="5675023" cy="3758673"/>
           </a:xfrm>
@@ -7587,12 +7852,12 @@
           </a:prstGeom>
         </p:spPr>
         <p:txBody>
-          <a:bodyPr anchor="t" rtlCol="false" tIns="0" lIns="0" bIns="0" rIns="0">
+          <a:bodyPr lIns="0" tIns="0" rIns="0" bIns="0" rtlCol="0" anchor="t">
             <a:spAutoFit/>
           </a:bodyPr>
           <a:lstStyle/>
           <a:p>
-            <a:pPr algn="l" marL="548714" indent="-274357" lvl="1">
+            <a:pPr marL="548714" lvl="1" indent="-274357" algn="l">
               <a:lnSpc>
                 <a:spcPts val="3303"/>
               </a:lnSpc>
@@ -7613,7 +7878,7 @@
             </a:r>
           </a:p>
           <a:p>
-            <a:pPr algn="l" marL="548714" indent="-274357" lvl="1">
+            <a:pPr marL="548714" lvl="1" indent="-274357" algn="l">
               <a:lnSpc>
                 <a:spcPts val="3303"/>
               </a:lnSpc>
@@ -7634,7 +7899,7 @@
             </a:r>
           </a:p>
           <a:p>
-            <a:pPr algn="l" marL="548714" indent="-274357" lvl="1">
+            <a:pPr marL="548714" lvl="1" indent="-274357" algn="l">
               <a:lnSpc>
                 <a:spcPts val="3303"/>
               </a:lnSpc>
@@ -7660,17 +7925,26 @@
                 <a:spcPts val="3303"/>
               </a:lnSpc>
             </a:pPr>
-          </a:p>
-        </p:txBody>
-      </p:sp>
-      <p:sp>
-        <p:nvSpPr>
-          <p:cNvPr name="Freeform 5" id="5"/>
+            <a:endParaRPr lang="en-US" sz="2541">
+              <a:solidFill>
+                <a:srgbClr val="FFFFFF"/>
+              </a:solidFill>
+              <a:latin typeface="Open Sauce"/>
+              <a:ea typeface="Open Sauce"/>
+              <a:cs typeface="Open Sauce"/>
+              <a:sym typeface="Open Sauce"/>
+            </a:endParaRPr>
+          </a:p>
+        </p:txBody>
+      </p:sp>
+      <p:sp>
+        <p:nvSpPr>
+          <p:cNvPr id="5" name="Freeform 5"/>
           <p:cNvSpPr/>
           <p:nvPr/>
         </p:nvSpPr>
         <p:spPr>
-          <a:xfrm flipH="false" flipV="false" rot="0">
+          <a:xfrm>
             <a:off x="11954138" y="6703913"/>
             <a:ext cx="15841853" cy="16255633"/>
           </a:xfrm>
@@ -7679,9 +7953,9 @@
             <a:gdLst/>
             <a:ahLst/>
             <a:cxnLst/>
-            <a:rect r="r" b="b" t="t" l="l"/>
+            <a:rect l="l" t="t" r="r" b="b"/>
             <a:pathLst>
-              <a:path h="16255633" w="15841853">
+              <a:path w="15841853" h="16255633">
                 <a:moveTo>
                   <a:pt x="0" y="0"/>
                 </a:moveTo>
@@ -7710,10 +7984,17 @@
               </a:extLst>
             </a:blip>
             <a:stretch>
-              <a:fillRect l="0" t="0" r="0" b="0"/>
+              <a:fillRect/>
             </a:stretch>
           </a:blipFill>
         </p:spPr>
+        <p:txBody>
+          <a:bodyPr/>
+          <a:lstStyle/>
+          <a:p>
+            <a:endParaRPr lang="en-SE"/>
+          </a:p>
+        </p:txBody>
       </p:sp>
     </p:spTree>
   </p:cSld>
@@ -7724,13 +8005,14 @@
 </file>
 
 <file path=ppt/slides/slide8.xml><?xml version="1.0" encoding="utf-8"?>
-<p:sld xmlns:p="http://schemas.openxmlformats.org/presentationml/2006/main" xmlns:a="http://schemas.openxmlformats.org/drawingml/2006/main" xmlns:r="http://schemas.openxmlformats.org/officeDocument/2006/relationships">
+<p:sld xmlns:a="http://schemas.openxmlformats.org/drawingml/2006/main" xmlns:r="http://schemas.openxmlformats.org/officeDocument/2006/relationships" xmlns:p="http://schemas.openxmlformats.org/presentationml/2006/main">
   <p:cSld>
     <p:bg>
       <p:bgPr>
         <a:solidFill>
           <a:srgbClr val="1A1A1A"/>
         </a:solidFill>
+        <a:effectLst/>
       </p:bgPr>
     </p:bg>
     <p:spTree>
@@ -7749,12 +8031,12 @@
       </p:grpSpPr>
       <p:sp>
         <p:nvSpPr>
-          <p:cNvPr name="Freeform 2" id="2"/>
+          <p:cNvPr id="2" name="Freeform 2"/>
           <p:cNvSpPr/>
           <p:nvPr/>
         </p:nvSpPr>
         <p:spPr>
-          <a:xfrm flipH="false" flipV="false" rot="0">
+          <a:xfrm>
             <a:off x="1235636" y="4924810"/>
             <a:ext cx="14917173" cy="4967200"/>
           </a:xfrm>
@@ -7763,9 +8045,9 @@
             <a:gdLst/>
             <a:ahLst/>
             <a:cxnLst/>
-            <a:rect r="r" b="b" t="t" l="l"/>
+            <a:rect l="l" t="t" r="r" b="b"/>
             <a:pathLst>
-              <a:path h="4967200" w="14917173">
+              <a:path w="14917173" h="4967200">
                 <a:moveTo>
                   <a:pt x="0" y="0"/>
                 </a:moveTo>
@@ -7788,19 +8070,26 @@
           <a:blipFill>
             <a:blip r:embed="rId3"/>
             <a:stretch>
-              <a:fillRect l="0" t="0" r="0" b="0"/>
+              <a:fillRect/>
             </a:stretch>
           </a:blipFill>
         </p:spPr>
-      </p:sp>
-      <p:sp>
-        <p:nvSpPr>
-          <p:cNvPr name="TextBox 3" id="3"/>
-          <p:cNvSpPr txBox="true"/>
+        <p:txBody>
+          <a:bodyPr/>
+          <a:lstStyle/>
+          <a:p>
+            <a:endParaRPr lang="en-SE"/>
+          </a:p>
+        </p:txBody>
+      </p:sp>
+      <p:sp>
+        <p:nvSpPr>
+          <p:cNvPr id="3" name="TextBox 3"/>
+          <p:cNvSpPr txBox="1"/>
           <p:nvPr/>
         </p:nvSpPr>
         <p:spPr>
-          <a:xfrm rot="0">
+          <a:xfrm>
             <a:off x="10908999" y="971550"/>
             <a:ext cx="5243810" cy="537845"/>
           </a:xfrm>
@@ -7809,7 +8098,7 @@
           </a:prstGeom>
         </p:spPr>
         <p:txBody>
-          <a:bodyPr anchor="t" rtlCol="false" tIns="0" lIns="0" bIns="0" rIns="0">
+          <a:bodyPr lIns="0" tIns="0" rIns="0" bIns="0" rtlCol="0" anchor="t">
             <a:spAutoFit/>
           </a:bodyPr>
           <a:lstStyle/>
@@ -7820,7 +8109,7 @@
               </a:lnSpc>
             </a:pPr>
             <a:r>
-              <a:rPr lang="en-US" sz="3200" b="true">
+              <a:rPr lang="en-US" sz="3200" b="1">
                 <a:solidFill>
                   <a:srgbClr val="FFFFFF"/>
                 </a:solidFill>
@@ -7836,12 +8125,12 @@
       </p:sp>
       <p:sp>
         <p:nvSpPr>
-          <p:cNvPr name="TextBox 4" id="4"/>
-          <p:cNvSpPr txBox="true"/>
+          <p:cNvPr id="4" name="TextBox 4"/>
+          <p:cNvSpPr txBox="1"/>
           <p:nvPr/>
         </p:nvSpPr>
         <p:spPr>
-          <a:xfrm rot="0">
+          <a:xfrm>
             <a:off x="9365559" y="2037566"/>
             <a:ext cx="8330690" cy="2722523"/>
           </a:xfrm>
@@ -7850,12 +8139,12 @@
           </a:prstGeom>
         </p:spPr>
         <p:txBody>
-          <a:bodyPr anchor="t" rtlCol="false" tIns="0" lIns="0" bIns="0" rIns="0">
+          <a:bodyPr lIns="0" tIns="0" rIns="0" bIns="0" rtlCol="0" anchor="t">
             <a:spAutoFit/>
           </a:bodyPr>
           <a:lstStyle/>
           <a:p>
-            <a:pPr algn="l" marL="513437" indent="-256718" lvl="1">
+            <a:pPr marL="513437" lvl="1" indent="-256718" algn="l">
               <a:lnSpc>
                 <a:spcPts val="3091"/>
               </a:lnSpc>
@@ -7876,7 +8165,7 @@
             </a:r>
           </a:p>
           <a:p>
-            <a:pPr algn="l" marL="513437" indent="-256718" lvl="1">
+            <a:pPr marL="513437" lvl="1" indent="-256718" algn="l">
               <a:lnSpc>
                 <a:spcPts val="3091"/>
               </a:lnSpc>
@@ -7897,7 +8186,7 @@
             </a:r>
           </a:p>
           <a:p>
-            <a:pPr algn="l" marL="513437" indent="-256718" lvl="1">
+            <a:pPr marL="513437" lvl="1" indent="-256718" algn="l">
               <a:lnSpc>
                 <a:spcPts val="3091"/>
               </a:lnSpc>
@@ -7926,17 +8215,26 @@
                 <a:spcPct val="0"/>
               </a:spcBef>
             </a:pPr>
-          </a:p>
-        </p:txBody>
-      </p:sp>
-      <p:sp>
-        <p:nvSpPr>
-          <p:cNvPr name="Freeform 5" id="5"/>
+            <a:endParaRPr lang="en-US" sz="2378">
+              <a:solidFill>
+                <a:srgbClr val="FFFFFF"/>
+              </a:solidFill>
+              <a:latin typeface="Open Sauce"/>
+              <a:ea typeface="Open Sauce"/>
+              <a:cs typeface="Open Sauce"/>
+              <a:sym typeface="Open Sauce"/>
+            </a:endParaRPr>
+          </a:p>
+        </p:txBody>
+      </p:sp>
+      <p:sp>
+        <p:nvSpPr>
+          <p:cNvPr id="5" name="Freeform 5"/>
           <p:cNvSpPr/>
           <p:nvPr/>
         </p:nvSpPr>
         <p:spPr>
-          <a:xfrm flipH="false" flipV="false" rot="0">
+          <a:xfrm>
             <a:off x="-7774378" y="-10422533"/>
             <a:ext cx="15841853" cy="16255633"/>
           </a:xfrm>
@@ -7945,9 +8243,9 @@
             <a:gdLst/>
             <a:ahLst/>
             <a:cxnLst/>
-            <a:rect r="r" b="b" t="t" l="l"/>
+            <a:rect l="l" t="t" r="r" b="b"/>
             <a:pathLst>
-              <a:path h="16255633" w="15841853">
+              <a:path w="15841853" h="16255633">
                 <a:moveTo>
                   <a:pt x="0" y="0"/>
                 </a:moveTo>
@@ -7976,10 +8274,17 @@
               </a:extLst>
             </a:blip>
             <a:stretch>
-              <a:fillRect l="0" t="0" r="0" b="0"/>
+              <a:fillRect/>
             </a:stretch>
           </a:blipFill>
         </p:spPr>
+        <p:txBody>
+          <a:bodyPr/>
+          <a:lstStyle/>
+          <a:p>
+            <a:endParaRPr lang="en-SE"/>
+          </a:p>
+        </p:txBody>
       </p:sp>
     </p:spTree>
   </p:cSld>
@@ -7990,7 +8295,7 @@
 </file>
 
 <file path=ppt/slides/slide9.xml><?xml version="1.0" encoding="utf-8"?>
-<p:sld xmlns:p="http://schemas.openxmlformats.org/presentationml/2006/main" xmlns:a="http://schemas.openxmlformats.org/drawingml/2006/main" xmlns:r="http://schemas.openxmlformats.org/officeDocument/2006/relationships">
+<p:sld xmlns:a="http://schemas.openxmlformats.org/drawingml/2006/main" xmlns:r="http://schemas.openxmlformats.org/officeDocument/2006/relationships" xmlns:p="http://schemas.openxmlformats.org/presentationml/2006/main">
   <p:cSld>
     <p:spTree>
       <p:nvGrpSpPr>
@@ -8008,12 +8313,12 @@
       </p:grpSpPr>
       <p:sp>
         <p:nvSpPr>
-          <p:cNvPr name="Freeform 2" id="2"/>
+          <p:cNvPr id="2" name="Freeform 2"/>
           <p:cNvSpPr/>
           <p:nvPr/>
         </p:nvSpPr>
         <p:spPr>
-          <a:xfrm flipH="true" flipV="true" rot="0">
+          <a:xfrm flipH="1" flipV="1">
             <a:off x="0" y="0"/>
             <a:ext cx="18288000" cy="10287000"/>
           </a:xfrm>
@@ -8022,9 +8327,9 @@
             <a:gdLst/>
             <a:ahLst/>
             <a:cxnLst/>
-            <a:rect r="r" b="b" t="t" l="l"/>
+            <a:rect l="l" t="t" r="r" b="b"/>
             <a:pathLst>
-              <a:path h="10287000" w="18288000">
+              <a:path w="18288000" h="10287000">
                 <a:moveTo>
                   <a:pt x="18288000" y="10287000"/>
                 </a:moveTo>
@@ -8047,19 +8352,26 @@
           <a:blipFill>
             <a:blip r:embed="rId2"/>
             <a:stretch>
-              <a:fillRect l="0" t="-38888" r="0" b="-38888"/>
+              <a:fillRect t="-38888" b="-38888"/>
             </a:stretch>
           </a:blipFill>
         </p:spPr>
+        <p:txBody>
+          <a:bodyPr/>
+          <a:lstStyle/>
+          <a:p>
+            <a:endParaRPr lang="en-SE"/>
+          </a:p>
+        </p:txBody>
       </p:sp>
       <p:grpSp>
         <p:nvGrpSpPr>
-          <p:cNvPr name="Group 3" id="3"/>
+          <p:cNvPr id="3" name="Group 3"/>
           <p:cNvGrpSpPr/>
           <p:nvPr/>
         </p:nvGrpSpPr>
         <p:grpSpPr>
-          <a:xfrm rot="0">
+          <a:xfrm>
             <a:off x="0" y="0"/>
             <a:ext cx="18288000" cy="3086100"/>
             <a:chOff x="0" y="0"/>
@@ -8068,12 +8380,12 @@
         </p:grpSpPr>
         <p:sp>
           <p:nvSpPr>
-            <p:cNvPr name="Freeform 4" id="4"/>
+            <p:cNvPr id="4" name="Freeform 4"/>
             <p:cNvSpPr/>
             <p:nvPr/>
           </p:nvSpPr>
           <p:spPr>
-            <a:xfrm flipH="false" flipV="false" rot="0">
+            <a:xfrm>
               <a:off x="0" y="0"/>
               <a:ext cx="4816592" cy="812800"/>
             </a:xfrm>
@@ -8082,9 +8394,9 @@
               <a:gdLst/>
               <a:ahLst/>
               <a:cxnLst/>
-              <a:rect r="r" b="b" t="t" l="l"/>
+              <a:rect l="l" t="t" r="r" b="b"/>
               <a:pathLst>
-                <a:path h="812800" w="4816592">
+                <a:path w="4816592" h="812800">
                   <a:moveTo>
                     <a:pt x="0" y="0"/>
                   </a:moveTo>
@@ -8105,11 +8417,18 @@
               <a:srgbClr val="1A1A1A"/>
             </a:solidFill>
           </p:spPr>
+          <p:txBody>
+            <a:bodyPr/>
+            <a:lstStyle/>
+            <a:p>
+              <a:endParaRPr lang="en-SE"/>
+            </a:p>
+          </p:txBody>
         </p:sp>
         <p:sp>
           <p:nvSpPr>
-            <p:cNvPr name="TextBox 5" id="5"/>
-            <p:cNvSpPr txBox="true"/>
+            <p:cNvPr id="5" name="TextBox 5"/>
+            <p:cNvSpPr txBox="1"/>
             <p:nvPr/>
           </p:nvSpPr>
           <p:spPr>
@@ -8122,7 +8441,7 @@
             </a:prstGeom>
           </p:spPr>
           <p:txBody>
-            <a:bodyPr anchor="ctr" rtlCol="false" tIns="50800" lIns="50800" bIns="50800" rIns="50800"/>
+            <a:bodyPr lIns="50800" tIns="50800" rIns="50800" bIns="50800" rtlCol="0" anchor="ctr"/>
             <a:lstStyle/>
             <a:p>
               <a:pPr algn="ctr">
@@ -8130,18 +8449,19 @@
                   <a:spcPts val="2859"/>
                 </a:lnSpc>
               </a:pPr>
+              <a:endParaRPr/>
             </a:p>
           </p:txBody>
         </p:sp>
       </p:grpSp>
       <p:sp>
         <p:nvSpPr>
-          <p:cNvPr name="Freeform 6" id="6"/>
+          <p:cNvPr id="6" name="Freeform 6"/>
           <p:cNvSpPr/>
           <p:nvPr/>
         </p:nvSpPr>
         <p:spPr>
-          <a:xfrm flipH="false" flipV="false" rot="0">
+          <a:xfrm>
             <a:off x="13451022" y="-4729397"/>
             <a:ext cx="7616557" cy="7815497"/>
           </a:xfrm>
@@ -8150,9 +8470,9 @@
             <a:gdLst/>
             <a:ahLst/>
             <a:cxnLst/>
-            <a:rect r="r" b="b" t="t" l="l"/>
+            <a:rect l="l" t="t" r="r" b="b"/>
             <a:pathLst>
-              <a:path h="7815497" w="7616557">
+              <a:path w="7616557" h="7815497">
                 <a:moveTo>
                   <a:pt x="0" y="0"/>
                 </a:moveTo>
@@ -8181,19 +8501,26 @@
               </a:extLst>
             </a:blip>
             <a:stretch>
-              <a:fillRect l="0" t="0" r="0" b="0"/>
+              <a:fillRect/>
             </a:stretch>
           </a:blipFill>
         </p:spPr>
-      </p:sp>
-      <p:sp>
-        <p:nvSpPr>
-          <p:cNvPr name="Freeform 7" id="7"/>
+        <p:txBody>
+          <a:bodyPr/>
+          <a:lstStyle/>
+          <a:p>
+            <a:endParaRPr lang="en-SE"/>
+          </a:p>
+        </p:txBody>
+      </p:sp>
+      <p:sp>
+        <p:nvSpPr>
+          <p:cNvPr id="7" name="Freeform 7"/>
           <p:cNvSpPr/>
           <p:nvPr/>
         </p:nvSpPr>
         <p:spPr>
-          <a:xfrm flipH="false" flipV="false" rot="0">
+          <a:xfrm>
             <a:off x="-2851369" y="-3442596"/>
             <a:ext cx="6709932" cy="6885191"/>
           </a:xfrm>
@@ -8202,9 +8529,9 @@
             <a:gdLst/>
             <a:ahLst/>
             <a:cxnLst/>
-            <a:rect r="r" b="b" t="t" l="l"/>
+            <a:rect l="l" t="t" r="r" b="b"/>
             <a:pathLst>
-              <a:path h="6885191" w="6709932">
+              <a:path w="6709932" h="6885191">
                 <a:moveTo>
                   <a:pt x="0" y="0"/>
                 </a:moveTo>
@@ -8233,19 +8560,26 @@
               </a:extLst>
             </a:blip>
             <a:stretch>
-              <a:fillRect l="0" t="0" r="0" b="0"/>
+              <a:fillRect/>
             </a:stretch>
           </a:blipFill>
         </p:spPr>
-      </p:sp>
-      <p:sp>
-        <p:nvSpPr>
-          <p:cNvPr name="TextBox 8" id="8"/>
-          <p:cNvSpPr txBox="true"/>
+        <p:txBody>
+          <a:bodyPr/>
+          <a:lstStyle/>
+          <a:p>
+            <a:endParaRPr lang="en-SE"/>
+          </a:p>
+        </p:txBody>
+      </p:sp>
+      <p:sp>
+        <p:nvSpPr>
+          <p:cNvPr id="8" name="TextBox 8"/>
+          <p:cNvSpPr txBox="1"/>
           <p:nvPr/>
         </p:nvSpPr>
         <p:spPr>
-          <a:xfrm rot="0">
+          <a:xfrm>
             <a:off x="3690980" y="1232286"/>
             <a:ext cx="10906040" cy="1349947"/>
           </a:xfrm>
@@ -8254,7 +8588,7 @@
           </a:prstGeom>
         </p:spPr>
         <p:txBody>
-          <a:bodyPr anchor="t" rtlCol="false" tIns="0" lIns="0" bIns="0" rIns="0">
+          <a:bodyPr lIns="0" tIns="0" rIns="0" bIns="0" rtlCol="0" anchor="t">
             <a:spAutoFit/>
           </a:bodyPr>
           <a:lstStyle/>
@@ -8265,7 +8599,7 @@
               </a:lnSpc>
             </a:pPr>
             <a:r>
-              <a:rPr lang="en-US" b="true" sz="8030" spc="786">
+              <a:rPr lang="en-US" sz="8030" b="1" spc="786">
                 <a:solidFill>
                   <a:srgbClr val="FFFFFF"/>
                 </a:solidFill>
@@ -8281,12 +8615,12 @@
       </p:sp>
       <p:grpSp>
         <p:nvGrpSpPr>
-          <p:cNvPr name="Group 9" id="9"/>
+          <p:cNvPr id="9" name="Group 9"/>
           <p:cNvGrpSpPr/>
           <p:nvPr/>
         </p:nvGrpSpPr>
         <p:grpSpPr>
-          <a:xfrm rot="0">
+          <a:xfrm>
             <a:off x="7224667" y="3427451"/>
             <a:ext cx="9678050" cy="3402223"/>
             <a:chOff x="0" y="0"/>
@@ -8295,12 +8629,12 @@
         </p:grpSpPr>
         <p:sp>
           <p:nvSpPr>
-            <p:cNvPr name="Freeform 10" id="10"/>
+            <p:cNvPr id="10" name="Freeform 10"/>
             <p:cNvSpPr/>
             <p:nvPr/>
           </p:nvSpPr>
           <p:spPr>
-            <a:xfrm flipH="false" flipV="false" rot="0">
+            <a:xfrm>
               <a:off x="0" y="0"/>
               <a:ext cx="1868989" cy="657025"/>
             </a:xfrm>
@@ -8309,9 +8643,9 @@
               <a:gdLst/>
               <a:ahLst/>
               <a:cxnLst/>
-              <a:rect r="r" b="b" t="t" l="l"/>
+              <a:rect l="l" t="t" r="r" b="b"/>
               <a:pathLst>
-                <a:path h="657025" w="1868989">
+                <a:path w="1868989" h="657025">
                   <a:moveTo>
                     <a:pt x="0" y="0"/>
                   </a:moveTo>
@@ -8341,11 +8675,18 @@
               <a:miter/>
             </a:ln>
           </p:spPr>
+          <p:txBody>
+            <a:bodyPr/>
+            <a:lstStyle/>
+            <a:p>
+              <a:endParaRPr lang="en-SE"/>
+            </a:p>
+          </p:txBody>
         </p:sp>
         <p:sp>
           <p:nvSpPr>
-            <p:cNvPr name="TextBox 11" id="11"/>
-            <p:cNvSpPr txBox="true"/>
+            <p:cNvPr id="11" name="TextBox 11"/>
+            <p:cNvSpPr txBox="1"/>
             <p:nvPr/>
           </p:nvSpPr>
           <p:spPr>
@@ -8358,7 +8699,7 @@
             </a:prstGeom>
           </p:spPr>
           <p:txBody>
-            <a:bodyPr anchor="ctr" rtlCol="false" tIns="50800" lIns="50800" bIns="50800" rIns="50800"/>
+            <a:bodyPr lIns="50800" tIns="50800" rIns="50800" bIns="50800" rtlCol="0" anchor="ctr"/>
             <a:lstStyle/>
             <a:p>
               <a:pPr algn="ctr">
@@ -8366,18 +8707,19 @@
                   <a:spcPts val="2859"/>
                 </a:lnSpc>
               </a:pPr>
+              <a:endParaRPr/>
             </a:p>
           </p:txBody>
         </p:sp>
       </p:grpSp>
       <p:sp>
         <p:nvSpPr>
-          <p:cNvPr name="TextBox 12" id="12"/>
-          <p:cNvSpPr txBox="true"/>
+          <p:cNvPr id="12" name="TextBox 12"/>
+          <p:cNvSpPr txBox="1"/>
           <p:nvPr/>
         </p:nvSpPr>
         <p:spPr>
-          <a:xfrm rot="0">
+          <a:xfrm>
             <a:off x="7224667" y="3581756"/>
             <a:ext cx="8900334" cy="3749450"/>
           </a:xfrm>
@@ -8386,12 +8728,12 @@
           </a:prstGeom>
         </p:spPr>
         <p:txBody>
-          <a:bodyPr anchor="t" rtlCol="false" tIns="0" lIns="0" bIns="0" rIns="0">
+          <a:bodyPr lIns="0" tIns="0" rIns="0" bIns="0" rtlCol="0" anchor="t">
             <a:spAutoFit/>
           </a:bodyPr>
           <a:lstStyle/>
           <a:p>
-            <a:pPr algn="l" marL="427768" indent="-213884" lvl="1">
+            <a:pPr marL="427768" lvl="1" indent="-213884" algn="l">
               <a:lnSpc>
                 <a:spcPts val="2734"/>
               </a:lnSpc>
@@ -8417,9 +8759,18 @@
                 <a:spcPts val="2734"/>
               </a:lnSpc>
             </a:pPr>
-          </a:p>
-          <a:p>
-            <a:pPr algn="l" marL="427768" indent="-213884" lvl="1">
+            <a:endParaRPr lang="en-US" sz="1981" spc="194">
+              <a:solidFill>
+                <a:srgbClr val="231F20"/>
+              </a:solidFill>
+              <a:latin typeface="DM Sans"/>
+              <a:ea typeface="DM Sans"/>
+              <a:cs typeface="DM Sans"/>
+              <a:sym typeface="DM Sans"/>
+            </a:endParaRPr>
+          </a:p>
+          <a:p>
+            <a:pPr marL="427768" lvl="1" indent="-213884" algn="l">
               <a:lnSpc>
                 <a:spcPts val="2734"/>
               </a:lnSpc>
@@ -8445,9 +8796,18 @@
                 <a:spcPts val="2734"/>
               </a:lnSpc>
             </a:pPr>
-          </a:p>
-          <a:p>
-            <a:pPr algn="l" marL="427768" indent="-213884" lvl="1">
+            <a:endParaRPr lang="en-US" sz="1981" spc="194">
+              <a:solidFill>
+                <a:srgbClr val="231F20"/>
+              </a:solidFill>
+              <a:latin typeface="DM Sans"/>
+              <a:ea typeface="DM Sans"/>
+              <a:cs typeface="DM Sans"/>
+              <a:sym typeface="DM Sans"/>
+            </a:endParaRPr>
+          </a:p>
+          <a:p>
+            <a:pPr marL="427768" lvl="1" indent="-213884" algn="l">
               <a:lnSpc>
                 <a:spcPts val="2734"/>
               </a:lnSpc>
@@ -8473,6 +8833,15 @@
                 <a:spcPts val="2734"/>
               </a:lnSpc>
             </a:pPr>
+            <a:endParaRPr lang="en-US" sz="1981" spc="194">
+              <a:solidFill>
+                <a:srgbClr val="231F20"/>
+              </a:solidFill>
+              <a:latin typeface="DM Sans"/>
+              <a:ea typeface="DM Sans"/>
+              <a:cs typeface="DM Sans"/>
+              <a:sym typeface="DM Sans"/>
+            </a:endParaRPr>
           </a:p>
           <a:p>
             <a:pPr algn="l">
@@ -8480,17 +8849,26 @@
                 <a:spcPts val="2734"/>
               </a:lnSpc>
             </a:pPr>
+            <a:endParaRPr lang="en-US" sz="1981" spc="194">
+              <a:solidFill>
+                <a:srgbClr val="231F20"/>
+              </a:solidFill>
+              <a:latin typeface="DM Sans"/>
+              <a:ea typeface="DM Sans"/>
+              <a:cs typeface="DM Sans"/>
+              <a:sym typeface="DM Sans"/>
+            </a:endParaRPr>
           </a:p>
         </p:txBody>
       </p:sp>
       <p:grpSp>
         <p:nvGrpSpPr>
-          <p:cNvPr name="Group 13" id="13"/>
+          <p:cNvPr id="13" name="Group 13"/>
           <p:cNvGrpSpPr/>
           <p:nvPr/>
         </p:nvGrpSpPr>
         <p:grpSpPr>
-          <a:xfrm rot="0">
+          <a:xfrm>
             <a:off x="613822" y="7171024"/>
             <a:ext cx="9034431" cy="2808103"/>
             <a:chOff x="0" y="0"/>
@@ -8499,12 +8877,12 @@
         </p:grpSpPr>
         <p:sp>
           <p:nvSpPr>
-            <p:cNvPr name="Freeform 14" id="14"/>
+            <p:cNvPr id="14" name="Freeform 14"/>
             <p:cNvSpPr/>
             <p:nvPr/>
           </p:nvSpPr>
           <p:spPr>
-            <a:xfrm flipH="false" flipV="false" rot="0">
+            <a:xfrm>
               <a:off x="0" y="0"/>
               <a:ext cx="1744696" cy="542290"/>
             </a:xfrm>
@@ -8513,9 +8891,9 @@
               <a:gdLst/>
               <a:ahLst/>
               <a:cxnLst/>
-              <a:rect r="r" b="b" t="t" l="l"/>
+              <a:rect l="l" t="t" r="r" b="b"/>
               <a:pathLst>
-                <a:path h="542290" w="1744696">
+                <a:path w="1744696" h="542290">
                   <a:moveTo>
                     <a:pt x="0" y="0"/>
                   </a:moveTo>
@@ -8545,11 +8923,18 @@
               <a:miter/>
             </a:ln>
           </p:spPr>
+          <p:txBody>
+            <a:bodyPr/>
+            <a:lstStyle/>
+            <a:p>
+              <a:endParaRPr lang="en-SE"/>
+            </a:p>
+          </p:txBody>
         </p:sp>
         <p:sp>
           <p:nvSpPr>
-            <p:cNvPr name="TextBox 15" id="15"/>
-            <p:cNvSpPr txBox="true"/>
+            <p:cNvPr id="15" name="TextBox 15"/>
+            <p:cNvSpPr txBox="1"/>
             <p:nvPr/>
           </p:nvSpPr>
           <p:spPr>
@@ -8562,7 +8947,7 @@
             </a:prstGeom>
           </p:spPr>
           <p:txBody>
-            <a:bodyPr anchor="ctr" rtlCol="false" tIns="50800" lIns="50800" bIns="50800" rIns="50800"/>
+            <a:bodyPr lIns="50800" tIns="50800" rIns="50800" bIns="50800" rtlCol="0" anchor="ctr"/>
             <a:lstStyle/>
             <a:p>
               <a:pPr algn="ctr">
@@ -8570,18 +8955,19 @@
                   <a:spcPts val="2859"/>
                 </a:lnSpc>
               </a:pPr>
+              <a:endParaRPr/>
             </a:p>
           </p:txBody>
         </p:sp>
       </p:grpSp>
       <p:sp>
         <p:nvSpPr>
-          <p:cNvPr name="TextBox 16" id="16"/>
-          <p:cNvSpPr txBox="true"/>
+          <p:cNvPr id="16" name="TextBox 16"/>
+          <p:cNvSpPr txBox="1"/>
           <p:nvPr/>
         </p:nvSpPr>
         <p:spPr>
-          <a:xfrm rot="0">
+          <a:xfrm>
             <a:off x="874822" y="7485349"/>
             <a:ext cx="8512431" cy="2041885"/>
           </a:xfrm>
@@ -8590,12 +8976,12 @@
           </a:prstGeom>
         </p:spPr>
         <p:txBody>
-          <a:bodyPr anchor="t" rtlCol="false" tIns="0" lIns="0" bIns="0" rIns="0">
+          <a:bodyPr lIns="0" tIns="0" rIns="0" bIns="0" rtlCol="0" anchor="t">
             <a:spAutoFit/>
           </a:bodyPr>
           <a:lstStyle/>
           <a:p>
-            <a:pPr algn="l" marL="427768" indent="-213884" lvl="1">
+            <a:pPr marL="427768" lvl="1" indent="-213884" algn="l">
               <a:lnSpc>
                 <a:spcPts val="2734"/>
               </a:lnSpc>
@@ -8621,9 +9007,18 @@
                 <a:spcPts val="2734"/>
               </a:lnSpc>
             </a:pPr>
-          </a:p>
-          <a:p>
-            <a:pPr algn="l" marL="427768" indent="-213884" lvl="1">
+            <a:endParaRPr lang="en-US" sz="1981" spc="194">
+              <a:solidFill>
+                <a:srgbClr val="231F20"/>
+              </a:solidFill>
+              <a:latin typeface="DM Sans"/>
+              <a:ea typeface="DM Sans"/>
+              <a:cs typeface="DM Sans"/>
+              <a:sym typeface="DM Sans"/>
+            </a:endParaRPr>
+          </a:p>
+          <a:p>
+            <a:pPr marL="427768" lvl="1" indent="-213884" algn="l">
               <a:lnSpc>
                 <a:spcPts val="2734"/>
               </a:lnSpc>

</xml_diff>